<commit_message>
Added linear regression and AI slides to presentation
</commit_message>
<xml_diff>
--- a/CourseMaterials/Best Practices for Software Development using MATLAB.pptx
+++ b/CourseMaterials/Best Practices for Software Development using MATLAB.pptx
@@ -7,7 +7,7 @@
     <p:sldMasterId id="2147483711" r:id="rId3"/>
   </p:sldMasterIdLst>
   <p:notesMasterIdLst>
-    <p:notesMasterId r:id="rId63"/>
+    <p:notesMasterId r:id="rId69"/>
   </p:notesMasterIdLst>
   <p:sldIdLst>
     <p:sldId id="257" r:id="rId4"/>
@@ -47,28 +47,34 @@
     <p:sldId id="346" r:id="rId38"/>
     <p:sldId id="347" r:id="rId39"/>
     <p:sldId id="417" r:id="rId40"/>
-    <p:sldId id="260" r:id="rId41"/>
-    <p:sldId id="261" r:id="rId42"/>
-    <p:sldId id="262" r:id="rId43"/>
-    <p:sldId id="413" r:id="rId44"/>
-    <p:sldId id="263" r:id="rId45"/>
-    <p:sldId id="274" r:id="rId46"/>
-    <p:sldId id="264" r:id="rId47"/>
-    <p:sldId id="265" r:id="rId48"/>
-    <p:sldId id="282" r:id="rId49"/>
-    <p:sldId id="418" r:id="rId50"/>
-    <p:sldId id="266" r:id="rId51"/>
-    <p:sldId id="267" r:id="rId52"/>
-    <p:sldId id="268" r:id="rId53"/>
-    <p:sldId id="270" r:id="rId54"/>
-    <p:sldId id="415" r:id="rId55"/>
-    <p:sldId id="422" r:id="rId56"/>
-    <p:sldId id="419" r:id="rId57"/>
-    <p:sldId id="420" r:id="rId58"/>
-    <p:sldId id="421" r:id="rId59"/>
-    <p:sldId id="283" r:id="rId60"/>
-    <p:sldId id="284" r:id="rId61"/>
-    <p:sldId id="423" r:id="rId62"/>
+    <p:sldId id="442" r:id="rId41"/>
+    <p:sldId id="260" r:id="rId42"/>
+    <p:sldId id="261" r:id="rId43"/>
+    <p:sldId id="262" r:id="rId44"/>
+    <p:sldId id="413" r:id="rId45"/>
+    <p:sldId id="263" r:id="rId46"/>
+    <p:sldId id="274" r:id="rId47"/>
+    <p:sldId id="264" r:id="rId48"/>
+    <p:sldId id="265" r:id="rId49"/>
+    <p:sldId id="443" r:id="rId50"/>
+    <p:sldId id="444" r:id="rId51"/>
+    <p:sldId id="445" r:id="rId52"/>
+    <p:sldId id="446" r:id="rId53"/>
+    <p:sldId id="447" r:id="rId54"/>
+    <p:sldId id="282" r:id="rId55"/>
+    <p:sldId id="418" r:id="rId56"/>
+    <p:sldId id="266" r:id="rId57"/>
+    <p:sldId id="267" r:id="rId58"/>
+    <p:sldId id="268" r:id="rId59"/>
+    <p:sldId id="270" r:id="rId60"/>
+    <p:sldId id="415" r:id="rId61"/>
+    <p:sldId id="422" r:id="rId62"/>
+    <p:sldId id="419" r:id="rId63"/>
+    <p:sldId id="420" r:id="rId64"/>
+    <p:sldId id="421" r:id="rId65"/>
+    <p:sldId id="283" r:id="rId66"/>
+    <p:sldId id="284" r:id="rId67"/>
+    <p:sldId id="423" r:id="rId68"/>
   </p:sldIdLst>
   <p:sldSz cx="12192000" cy="6858000"/>
   <p:notesSz cx="6858000" cy="9144000"/>
@@ -178,7 +184,7 @@
 <file path=ppt/revisionInfo.xml><?xml version="1.0" encoding="utf-8"?>
 <p1510:revInfo xmlns:a="http://schemas.openxmlformats.org/drawingml/2006/main" xmlns:r="http://schemas.openxmlformats.org/officeDocument/2006/relationships" xmlns:p1510="http://schemas.microsoft.com/office/powerpoint/2015/10/main">
   <p1510:revLst>
-    <p1510:client id="{6A0AEAFE-45F1-4F78-BF24-2A99E964B86F}" v="52" dt="2024-06-03T11:23:11.826"/>
+    <p1510:client id="{6A0AEAFE-45F1-4F78-BF24-2A99E964B86F}" v="54" dt="2024-06-10T08:41:35.540"/>
   </p1510:revLst>
 </p1510:revInfo>
 </file>
@@ -188,7 +194,7 @@
   <pc:docChgLst>
     <pc:chgData name="Louise Brown (staff)" userId="de8b7712-bd89-438d-bea6-a54e5199a8bd" providerId="ADAL" clId="{6A0AEAFE-45F1-4F78-BF24-2A99E964B86F}"/>
     <pc:docChg chg="undo custSel addSld delSld modSld">
-      <pc:chgData name="Louise Brown (staff)" userId="de8b7712-bd89-438d-bea6-a54e5199a8bd" providerId="ADAL" clId="{6A0AEAFE-45F1-4F78-BF24-2A99E964B86F}" dt="2024-06-03T11:23:16.217" v="354" actId="47"/>
+      <pc:chgData name="Louise Brown (staff)" userId="de8b7712-bd89-438d-bea6-a54e5199a8bd" providerId="ADAL" clId="{6A0AEAFE-45F1-4F78-BF24-2A99E964B86F}" dt="2024-06-10T08:41:35.540" v="356"/>
       <pc:docMkLst>
         <pc:docMk/>
       </pc:docMkLst>
@@ -1907,6 +1913,48 @@
           </ac:spMkLst>
         </pc:spChg>
       </pc:sldChg>
+      <pc:sldChg chg="add">
+        <pc:chgData name="Louise Brown (staff)" userId="de8b7712-bd89-438d-bea6-a54e5199a8bd" providerId="ADAL" clId="{6A0AEAFE-45F1-4F78-BF24-2A99E964B86F}" dt="2024-06-10T08:40:00.883" v="355"/>
+        <pc:sldMkLst>
+          <pc:docMk/>
+          <pc:sldMk cId="3118138934" sldId="442"/>
+        </pc:sldMkLst>
+      </pc:sldChg>
+      <pc:sldChg chg="add">
+        <pc:chgData name="Louise Brown (staff)" userId="de8b7712-bd89-438d-bea6-a54e5199a8bd" providerId="ADAL" clId="{6A0AEAFE-45F1-4F78-BF24-2A99E964B86F}" dt="2024-06-10T08:41:35.540" v="356"/>
+        <pc:sldMkLst>
+          <pc:docMk/>
+          <pc:sldMk cId="4136546853" sldId="443"/>
+        </pc:sldMkLst>
+      </pc:sldChg>
+      <pc:sldChg chg="add">
+        <pc:chgData name="Louise Brown (staff)" userId="de8b7712-bd89-438d-bea6-a54e5199a8bd" providerId="ADAL" clId="{6A0AEAFE-45F1-4F78-BF24-2A99E964B86F}" dt="2024-06-10T08:41:35.540" v="356"/>
+        <pc:sldMkLst>
+          <pc:docMk/>
+          <pc:sldMk cId="1817866727" sldId="444"/>
+        </pc:sldMkLst>
+      </pc:sldChg>
+      <pc:sldChg chg="add">
+        <pc:chgData name="Louise Brown (staff)" userId="de8b7712-bd89-438d-bea6-a54e5199a8bd" providerId="ADAL" clId="{6A0AEAFE-45F1-4F78-BF24-2A99E964B86F}" dt="2024-06-10T08:41:35.540" v="356"/>
+        <pc:sldMkLst>
+          <pc:docMk/>
+          <pc:sldMk cId="439337608" sldId="445"/>
+        </pc:sldMkLst>
+      </pc:sldChg>
+      <pc:sldChg chg="add">
+        <pc:chgData name="Louise Brown (staff)" userId="de8b7712-bd89-438d-bea6-a54e5199a8bd" providerId="ADAL" clId="{6A0AEAFE-45F1-4F78-BF24-2A99E964B86F}" dt="2024-06-10T08:41:35.540" v="356"/>
+        <pc:sldMkLst>
+          <pc:docMk/>
+          <pc:sldMk cId="1148636722" sldId="446"/>
+        </pc:sldMkLst>
+      </pc:sldChg>
+      <pc:sldChg chg="add">
+        <pc:chgData name="Louise Brown (staff)" userId="de8b7712-bd89-438d-bea6-a54e5199a8bd" providerId="ADAL" clId="{6A0AEAFE-45F1-4F78-BF24-2A99E964B86F}" dt="2024-06-10T08:41:35.540" v="356"/>
+        <pc:sldMkLst>
+          <pc:docMk/>
+          <pc:sldMk cId="2024611758" sldId="447"/>
+        </pc:sldMkLst>
+      </pc:sldChg>
       <pc:sldChg chg="modSp del mod">
         <pc:chgData name="Louise Brown (staff)" userId="de8b7712-bd89-438d-bea6-a54e5199a8bd" providerId="ADAL" clId="{6A0AEAFE-45F1-4F78-BF24-2A99E964B86F}" dt="2024-06-03T09:44:41.714" v="181"/>
         <pc:sldMkLst>
@@ -2054,7 +2102,7 @@
           <a:p>
             <a:fld id="{6C06565E-6C9B-4A06-A09A-D231B01EEF1C}" type="datetimeFigureOut">
               <a:rPr lang="en-GB" smtClean="0"/>
-              <a:t>03/06/2024</a:t>
+              <a:t>10/06/2024</a:t>
             </a:fld>
             <a:endParaRPr lang="en-GB"/>
           </a:p>
@@ -3002,7 +3050,7 @@
                 </a:solidFill>
               </a:rPr>
               <a:pPr/>
-              <a:t>42</a:t>
+              <a:t>43</a:t>
             </a:fld>
             <a:endParaRPr lang="en-GB">
               <a:solidFill>
@@ -3131,7 +3179,7 @@
           <a:p>
             <a:fld id="{0561F5E7-E9A3-428D-802F-730F07CBE60A}" type="slidenum">
               <a:rPr lang="en-GB" smtClean="0"/>
-              <a:t>45</a:t>
+              <a:t>46</a:t>
             </a:fld>
             <a:endParaRPr lang="en-GB"/>
           </a:p>
@@ -4238,7 +4286,7 @@
                 </a:solidFill>
               </a:rPr>
               <a:pPr/>
-              <a:t>03/06/2024</a:t>
+              <a:t>10/06/2024</a:t>
             </a:fld>
             <a:endParaRPr lang="en-GB">
               <a:solidFill>
@@ -4440,7 +4488,7 @@
                 </a:solidFill>
               </a:rPr>
               <a:pPr/>
-              <a:t>03/06/2024</a:t>
+              <a:t>10/06/2024</a:t>
             </a:fld>
             <a:endParaRPr lang="en-GB">
               <a:solidFill>
@@ -4652,7 +4700,7 @@
                 </a:solidFill>
               </a:rPr>
               <a:pPr/>
-              <a:t>03/06/2024</a:t>
+              <a:t>10/06/2024</a:t>
             </a:fld>
             <a:endParaRPr lang="en-GB">
               <a:solidFill>
@@ -6364,7 +6412,7 @@
                 </a:solidFill>
               </a:rPr>
               <a:pPr/>
-              <a:t>03/06/2024</a:t>
+              <a:t>10/06/2024</a:t>
             </a:fld>
             <a:endParaRPr lang="en-GB">
               <a:solidFill>
@@ -7146,7 +7194,7 @@
           <a:p>
             <a:fld id="{F4D14FF6-3E0D-407D-982E-9B686EE47223}" type="datetimeFigureOut">
               <a:rPr lang="en-GB" smtClean="0"/>
-              <a:t>03/06/2024</a:t>
+              <a:t>10/06/2024</a:t>
             </a:fld>
             <a:endParaRPr lang="en-GB"/>
           </a:p>
@@ -7316,7 +7364,7 @@
           <a:p>
             <a:fld id="{F4D14FF6-3E0D-407D-982E-9B686EE47223}" type="datetimeFigureOut">
               <a:rPr lang="en-GB" smtClean="0"/>
-              <a:t>03/06/2024</a:t>
+              <a:t>10/06/2024</a:t>
             </a:fld>
             <a:endParaRPr lang="en-GB"/>
           </a:p>
@@ -7562,7 +7610,7 @@
           <a:p>
             <a:fld id="{F4D14FF6-3E0D-407D-982E-9B686EE47223}" type="datetimeFigureOut">
               <a:rPr lang="en-GB" smtClean="0"/>
-              <a:t>03/06/2024</a:t>
+              <a:t>10/06/2024</a:t>
             </a:fld>
             <a:endParaRPr lang="en-GB"/>
           </a:p>
@@ -7794,7 +7842,7 @@
           <a:p>
             <a:fld id="{F4D14FF6-3E0D-407D-982E-9B686EE47223}" type="datetimeFigureOut">
               <a:rPr lang="en-GB" smtClean="0"/>
-              <a:t>03/06/2024</a:t>
+              <a:t>10/06/2024</a:t>
             </a:fld>
             <a:endParaRPr lang="en-GB"/>
           </a:p>
@@ -8161,7 +8209,7 @@
           <a:p>
             <a:fld id="{F4D14FF6-3E0D-407D-982E-9B686EE47223}" type="datetimeFigureOut">
               <a:rPr lang="en-GB" smtClean="0"/>
-              <a:t>03/06/2024</a:t>
+              <a:t>10/06/2024</a:t>
             </a:fld>
             <a:endParaRPr lang="en-GB"/>
           </a:p>
@@ -8279,7 +8327,7 @@
           <a:p>
             <a:fld id="{F4D14FF6-3E0D-407D-982E-9B686EE47223}" type="datetimeFigureOut">
               <a:rPr lang="en-GB" smtClean="0"/>
-              <a:t>03/06/2024</a:t>
+              <a:t>10/06/2024</a:t>
             </a:fld>
             <a:endParaRPr lang="en-GB"/>
           </a:p>
@@ -8374,7 +8422,7 @@
           <a:p>
             <a:fld id="{F4D14FF6-3E0D-407D-982E-9B686EE47223}" type="datetimeFigureOut">
               <a:rPr lang="en-GB" smtClean="0"/>
-              <a:t>03/06/2024</a:t>
+              <a:t>10/06/2024</a:t>
             </a:fld>
             <a:endParaRPr lang="en-GB"/>
           </a:p>
@@ -8627,7 +8675,7 @@
                 </a:solidFill>
               </a:rPr>
               <a:pPr/>
-              <a:t>03/06/2024</a:t>
+              <a:t>10/06/2024</a:t>
             </a:fld>
             <a:endParaRPr lang="en-GB">
               <a:solidFill>
@@ -8929,7 +8977,7 @@
           <a:p>
             <a:fld id="{F4D14FF6-3E0D-407D-982E-9B686EE47223}" type="datetimeFigureOut">
               <a:rPr lang="en-GB" smtClean="0"/>
-              <a:t>03/06/2024</a:t>
+              <a:t>10/06/2024</a:t>
             </a:fld>
             <a:endParaRPr lang="en-GB"/>
           </a:p>
@@ -9186,7 +9234,7 @@
           <a:p>
             <a:fld id="{F4D14FF6-3E0D-407D-982E-9B686EE47223}" type="datetimeFigureOut">
               <a:rPr lang="en-GB" smtClean="0"/>
-              <a:t>03/06/2024</a:t>
+              <a:t>10/06/2024</a:t>
             </a:fld>
             <a:endParaRPr lang="en-GB"/>
           </a:p>
@@ -9356,7 +9404,7 @@
           <a:p>
             <a:fld id="{F4D14FF6-3E0D-407D-982E-9B686EE47223}" type="datetimeFigureOut">
               <a:rPr lang="en-GB" smtClean="0"/>
-              <a:t>03/06/2024</a:t>
+              <a:t>10/06/2024</a:t>
             </a:fld>
             <a:endParaRPr lang="en-GB"/>
           </a:p>
@@ -9536,7 +9584,7 @@
           <a:p>
             <a:fld id="{F4D14FF6-3E0D-407D-982E-9B686EE47223}" type="datetimeFigureOut">
               <a:rPr lang="en-GB" smtClean="0"/>
-              <a:t>03/06/2024</a:t>
+              <a:t>10/06/2024</a:t>
             </a:fld>
             <a:endParaRPr lang="en-GB"/>
           </a:p>
@@ -10111,7 +10159,7 @@
                 </a:solidFill>
               </a:rPr>
               <a:pPr/>
-              <a:t>03/06/2024</a:t>
+              <a:t>10/06/2024</a:t>
             </a:fld>
             <a:endParaRPr lang="en-GB">
               <a:solidFill>
@@ -10565,7 +10613,7 @@
                 </a:solidFill>
               </a:rPr>
               <a:pPr/>
-              <a:t>03/06/2024</a:t>
+              <a:t>10/06/2024</a:t>
             </a:fld>
             <a:endParaRPr lang="en-GB">
               <a:solidFill>
@@ -10715,7 +10763,7 @@
                 </a:solidFill>
               </a:rPr>
               <a:pPr/>
-              <a:t>03/06/2024</a:t>
+              <a:t>10/06/2024</a:t>
             </a:fld>
             <a:endParaRPr lang="en-GB">
               <a:solidFill>
@@ -10842,7 +10890,7 @@
                 </a:solidFill>
               </a:rPr>
               <a:pPr/>
-              <a:t>03/06/2024</a:t>
+              <a:t>10/06/2024</a:t>
             </a:fld>
             <a:endParaRPr lang="en-GB">
               <a:solidFill>
@@ -11151,7 +11199,7 @@
                 </a:solidFill>
               </a:rPr>
               <a:pPr/>
-              <a:t>03/06/2024</a:t>
+              <a:t>10/06/2024</a:t>
             </a:fld>
             <a:endParaRPr lang="en-GB">
               <a:solidFill>
@@ -11436,7 +11484,7 @@
                 </a:solidFill>
               </a:rPr>
               <a:pPr/>
-              <a:t>03/06/2024</a:t>
+              <a:t>10/06/2024</a:t>
             </a:fld>
             <a:endParaRPr lang="en-GB">
               <a:solidFill>
@@ -11681,7 +11729,7 @@
                 </a:solidFill>
               </a:rPr>
               <a:pPr/>
-              <a:t>03/06/2024</a:t>
+              <a:t>10/06/2024</a:t>
             </a:fld>
             <a:endParaRPr lang="en-GB">
               <a:solidFill>
@@ -12678,7 +12726,7 @@
           <a:p>
             <a:fld id="{F4D14FF6-3E0D-407D-982E-9B686EE47223}" type="datetimeFigureOut">
               <a:rPr lang="en-GB" smtClean="0"/>
-              <a:t>03/06/2024</a:t>
+              <a:t>10/06/2024</a:t>
             </a:fld>
             <a:endParaRPr lang="en-GB"/>
           </a:p>
@@ -26689,6 +26737,145 @@
           </a:p>
         </p:txBody>
       </p:sp>
+      <p:sp>
+        <p:nvSpPr>
+          <p:cNvPr id="4" name="Content Placeholder 3"/>
+          <p:cNvSpPr>
+            <a:spLocks noGrp="1"/>
+          </p:cNvSpPr>
+          <p:nvPr>
+            <p:ph idx="1"/>
+          </p:nvPr>
+        </p:nvSpPr>
+        <p:spPr>
+          <a:xfrm>
+            <a:off x="314325" y="2389427"/>
+            <a:ext cx="5025426" cy="4351338"/>
+          </a:xfrm>
+        </p:spPr>
+        <p:txBody>
+          <a:bodyPr>
+            <a:noAutofit/>
+          </a:bodyPr>
+          <a:lstStyle/>
+          <a:p>
+            <a:r>
+              <a:rPr lang="en-GB" sz="2400" dirty="0"/>
+              <a:t>Regression is the process of using measured data to fit a model of a relationship between variables</a:t>
+            </a:r>
+          </a:p>
+          <a:p>
+            <a:endParaRPr lang="en-GB" sz="2400" dirty="0"/>
+          </a:p>
+          <a:p>
+            <a:r>
+              <a:rPr lang="en-GB" sz="2400" dirty="0"/>
+              <a:t>In this case between </a:t>
+            </a:r>
+            <a:r>
+              <a:rPr lang="en-GB" sz="2400" b="1" dirty="0"/>
+              <a:t>pulse pressure </a:t>
+            </a:r>
+            <a:r>
+              <a:rPr lang="en-GB" sz="2400" dirty="0"/>
+              <a:t>(dependent variable) and </a:t>
+            </a:r>
+            <a:r>
+              <a:rPr lang="en-GB" sz="2400" b="1" dirty="0"/>
+              <a:t>age </a:t>
+            </a:r>
+            <a:r>
+              <a:rPr lang="en-GB" sz="2400" dirty="0"/>
+              <a:t>(independent variable)</a:t>
+            </a:r>
+          </a:p>
+          <a:p>
+            <a:endParaRPr lang="en-GB" dirty="0"/>
+          </a:p>
+        </p:txBody>
+      </p:sp>
+      <p:pic>
+        <p:nvPicPr>
+          <p:cNvPr id="5" name="Picture 4">
+            <a:extLst>
+              <a:ext uri="{FF2B5EF4-FFF2-40B4-BE49-F238E27FC236}">
+                <a16:creationId xmlns:a16="http://schemas.microsoft.com/office/drawing/2014/main" id="{32C5B229-BCDC-4FF3-98B4-660CEC5CD03D}"/>
+              </a:ext>
+            </a:extLst>
+          </p:cNvPr>
+          <p:cNvPicPr>
+            <a:picLocks noChangeAspect="1"/>
+          </p:cNvPicPr>
+          <p:nvPr/>
+        </p:nvPicPr>
+        <p:blipFill rotWithShape="1">
+          <a:blip r:embed="rId2"/>
+          <a:srcRect t="14584"/>
+          <a:stretch/>
+        </p:blipFill>
+        <p:spPr>
+          <a:xfrm>
+            <a:off x="5148056" y="1406313"/>
+            <a:ext cx="6729619" cy="5086562"/>
+          </a:xfrm>
+          <a:prstGeom prst="rect">
+            <a:avLst/>
+          </a:prstGeom>
+        </p:spPr>
+      </p:pic>
+    </p:spTree>
+    <p:extLst>
+      <p:ext uri="{BB962C8B-B14F-4D97-AF65-F5344CB8AC3E}">
+        <p14:creationId xmlns:p14="http://schemas.microsoft.com/office/powerpoint/2010/main" val="3118138934"/>
+      </p:ext>
+    </p:extLst>
+  </p:cSld>
+  <p:clrMapOvr>
+    <a:masterClrMapping/>
+  </p:clrMapOvr>
+</p:sld>
+</file>
+
+<file path=ppt/slides/slide39.xml><?xml version="1.0" encoding="utf-8"?>
+<p:sld xmlns:a="http://schemas.openxmlformats.org/drawingml/2006/main" xmlns:r="http://schemas.openxmlformats.org/officeDocument/2006/relationships" xmlns:p="http://schemas.openxmlformats.org/presentationml/2006/main">
+  <p:cSld>
+    <p:spTree>
+      <p:nvGrpSpPr>
+        <p:cNvPr id="1" name=""/>
+        <p:cNvGrpSpPr/>
+        <p:nvPr/>
+      </p:nvGrpSpPr>
+      <p:grpSpPr>
+        <a:xfrm>
+          <a:off x="0" y="0"/>
+          <a:ext cx="0" cy="0"/>
+          <a:chOff x="0" y="0"/>
+          <a:chExt cx="0" cy="0"/>
+        </a:xfrm>
+      </p:grpSpPr>
+      <p:sp>
+        <p:nvSpPr>
+          <p:cNvPr id="2" name="Title 1"/>
+          <p:cNvSpPr>
+            <a:spLocks noGrp="1"/>
+          </p:cNvSpPr>
+          <p:nvPr>
+            <p:ph type="title"/>
+          </p:nvPr>
+        </p:nvSpPr>
+        <p:spPr/>
+        <p:txBody>
+          <a:bodyPr/>
+          <a:lstStyle/>
+          <a:p>
+            <a:pPr algn="ctr"/>
+            <a:r>
+              <a:rPr lang="en-GB" dirty="0"/>
+              <a:t>Linear Regression Models</a:t>
+            </a:r>
+          </a:p>
+        </p:txBody>
+      </p:sp>
       <mc:AlternateContent xmlns:mc="http://schemas.openxmlformats.org/markup-compatibility/2006" xmlns:a14="http://schemas.microsoft.com/office/drawing/2010/main">
         <mc:Choice Requires="a14">
           <p:sp>
@@ -26920,7 +27107,199 @@
 </p:sld>
 </file>
 
-<file path=ppt/slides/slide39.xml><?xml version="1.0" encoding="utf-8"?>
+<file path=ppt/slides/slide4.xml><?xml version="1.0" encoding="utf-8"?>
+<p:sld xmlns:a="http://schemas.openxmlformats.org/drawingml/2006/main" xmlns:r="http://schemas.openxmlformats.org/officeDocument/2006/relationships" xmlns:p="http://schemas.openxmlformats.org/presentationml/2006/main">
+  <p:cSld>
+    <p:spTree>
+      <p:nvGrpSpPr>
+        <p:cNvPr id="1" name=""/>
+        <p:cNvGrpSpPr/>
+        <p:nvPr/>
+      </p:nvGrpSpPr>
+      <p:grpSpPr>
+        <a:xfrm>
+          <a:off x="0" y="0"/>
+          <a:ext cx="0" cy="0"/>
+          <a:chOff x="0" y="0"/>
+          <a:chExt cx="0" cy="0"/>
+        </a:xfrm>
+      </p:grpSpPr>
+      <p:sp>
+        <p:nvSpPr>
+          <p:cNvPr id="2" name="Title 1">
+            <a:extLst>
+              <a:ext uri="{FF2B5EF4-FFF2-40B4-BE49-F238E27FC236}">
+                <a16:creationId xmlns:a16="http://schemas.microsoft.com/office/drawing/2014/main" id="{69156C31-3711-45F0-B9C1-DFDAA5F560DD}"/>
+              </a:ext>
+            </a:extLst>
+          </p:cNvPr>
+          <p:cNvSpPr>
+            <a:spLocks noGrp="1"/>
+          </p:cNvSpPr>
+          <p:nvPr>
+            <p:ph type="title"/>
+          </p:nvPr>
+        </p:nvSpPr>
+        <p:spPr/>
+        <p:txBody>
+          <a:bodyPr/>
+          <a:lstStyle/>
+          <a:p>
+            <a:pPr algn="ctr"/>
+            <a:r>
+              <a:rPr lang="en-GB" dirty="0"/>
+              <a:t>What is Version Control?</a:t>
+            </a:r>
+          </a:p>
+        </p:txBody>
+      </p:sp>
+      <p:sp>
+        <p:nvSpPr>
+          <p:cNvPr id="7" name="TextBox 6">
+            <a:extLst>
+              <a:ext uri="{FF2B5EF4-FFF2-40B4-BE49-F238E27FC236}">
+                <a16:creationId xmlns:a16="http://schemas.microsoft.com/office/drawing/2014/main" id="{B2AC47F3-9CE2-7E92-C558-00565A705012}"/>
+              </a:ext>
+            </a:extLst>
+          </p:cNvPr>
+          <p:cNvSpPr txBox="1"/>
+          <p:nvPr/>
+        </p:nvSpPr>
+        <p:spPr>
+          <a:xfrm>
+            <a:off x="1971728" y="2188085"/>
+            <a:ext cx="7684655" cy="830997"/>
+          </a:xfrm>
+          <a:prstGeom prst="rect">
+            <a:avLst/>
+          </a:prstGeom>
+          <a:noFill/>
+        </p:spPr>
+        <p:txBody>
+          <a:bodyPr wrap="square">
+            <a:spAutoFit/>
+          </a:bodyPr>
+          <a:lstStyle/>
+          <a:p>
+            <a:r>
+              <a:rPr lang="en-GB" sz="2400" dirty="0"/>
+              <a:t>‘… a system that records changes to a file or set of files over time so that you can recall specific versions later’ </a:t>
+            </a:r>
+            <a:r>
+              <a:rPr lang="en-GB" sz="2400" baseline="30000" dirty="0"/>
+              <a:t>1</a:t>
+            </a:r>
+            <a:endParaRPr lang="en-GB" sz="2400" dirty="0"/>
+          </a:p>
+        </p:txBody>
+      </p:sp>
+      <p:sp>
+        <p:nvSpPr>
+          <p:cNvPr id="8" name="TextBox 7">
+            <a:extLst>
+              <a:ext uri="{FF2B5EF4-FFF2-40B4-BE49-F238E27FC236}">
+                <a16:creationId xmlns:a16="http://schemas.microsoft.com/office/drawing/2014/main" id="{8894954C-4C0F-5D7D-90F6-A313EEC9DBA7}"/>
+              </a:ext>
+            </a:extLst>
+          </p:cNvPr>
+          <p:cNvSpPr txBox="1"/>
+          <p:nvPr/>
+        </p:nvSpPr>
+        <p:spPr>
+          <a:xfrm>
+            <a:off x="2678546" y="4327088"/>
+            <a:ext cx="4246832" cy="1384995"/>
+          </a:xfrm>
+          <a:prstGeom prst="rect">
+            <a:avLst/>
+          </a:prstGeom>
+          <a:noFill/>
+        </p:spPr>
+        <p:txBody>
+          <a:bodyPr wrap="square" rtlCol="0">
+            <a:spAutoFit/>
+          </a:bodyPr>
+          <a:lstStyle/>
+          <a:p>
+            <a:endParaRPr lang="en-GB" baseline="30000" dirty="0"/>
+          </a:p>
+          <a:p>
+            <a:r>
+              <a:rPr lang="en-GB" dirty="0"/>
+              <a:t>Pro Git book, available online (free!)</a:t>
+            </a:r>
+          </a:p>
+          <a:p>
+            <a:endParaRPr lang="en-GB" dirty="0"/>
+          </a:p>
+          <a:p>
+            <a:r>
+              <a:rPr lang="en-GB" baseline="30000" dirty="0"/>
+              <a:t>1 </a:t>
+            </a:r>
+            <a:r>
+              <a:rPr lang="en-GB" dirty="0">
+                <a:hlinkClick r:id="rId2"/>
+              </a:rPr>
+              <a:t>https://git-scm.com/book/en/v2/</a:t>
+            </a:r>
+            <a:endParaRPr lang="en-GB" dirty="0"/>
+          </a:p>
+          <a:p>
+            <a:endParaRPr lang="en-GB" dirty="0"/>
+          </a:p>
+        </p:txBody>
+      </p:sp>
+      <p:pic>
+        <p:nvPicPr>
+          <p:cNvPr id="9" name="Picture 8" descr="Pro Git book cover">
+            <a:extLst>
+              <a:ext uri="{FF2B5EF4-FFF2-40B4-BE49-F238E27FC236}">
+                <a16:creationId xmlns:a16="http://schemas.microsoft.com/office/drawing/2014/main" id="{39D4B845-41A6-03C9-87EA-559AB2773641}"/>
+              </a:ext>
+            </a:extLst>
+          </p:cNvPr>
+          <p:cNvPicPr>
+            <a:picLocks noChangeAspect="1"/>
+          </p:cNvPicPr>
+          <p:nvPr/>
+        </p:nvPicPr>
+        <p:blipFill>
+          <a:blip r:embed="rId3">
+            <a:extLst>
+              <a:ext uri="{28A0092B-C50C-407E-A947-70E740481C1C}">
+                <a14:useLocalDpi xmlns:a14="http://schemas.microsoft.com/office/drawing/2010/main" val="0"/>
+              </a:ext>
+            </a:extLst>
+          </a:blip>
+          <a:stretch>
+            <a:fillRect/>
+          </a:stretch>
+        </p:blipFill>
+        <p:spPr>
+          <a:xfrm>
+            <a:off x="7500273" y="3838919"/>
+            <a:ext cx="1788890" cy="2361334"/>
+          </a:xfrm>
+          <a:prstGeom prst="rect">
+            <a:avLst/>
+          </a:prstGeom>
+        </p:spPr>
+      </p:pic>
+    </p:spTree>
+    <p:extLst>
+      <p:ext uri="{BB962C8B-B14F-4D97-AF65-F5344CB8AC3E}">
+        <p14:creationId xmlns:p14="http://schemas.microsoft.com/office/powerpoint/2010/main" val="1221217987"/>
+      </p:ext>
+    </p:extLst>
+  </p:cSld>
+  <p:clrMapOvr>
+    <a:masterClrMapping/>
+  </p:clrMapOvr>
+</p:sld>
+</file>
+
+<file path=ppt/slides/slide40.xml><?xml version="1.0" encoding="utf-8"?>
 <p:sld xmlns:a="http://schemas.openxmlformats.org/drawingml/2006/main" xmlns:r="http://schemas.openxmlformats.org/officeDocument/2006/relationships" xmlns:p="http://schemas.openxmlformats.org/presentationml/2006/main">
   <p:cSld>
     <p:spTree>
@@ -27706,199 +28085,7 @@
 </p:sld>
 </file>
 
-<file path=ppt/slides/slide4.xml><?xml version="1.0" encoding="utf-8"?>
-<p:sld xmlns:a="http://schemas.openxmlformats.org/drawingml/2006/main" xmlns:r="http://schemas.openxmlformats.org/officeDocument/2006/relationships" xmlns:p="http://schemas.openxmlformats.org/presentationml/2006/main">
-  <p:cSld>
-    <p:spTree>
-      <p:nvGrpSpPr>
-        <p:cNvPr id="1" name=""/>
-        <p:cNvGrpSpPr/>
-        <p:nvPr/>
-      </p:nvGrpSpPr>
-      <p:grpSpPr>
-        <a:xfrm>
-          <a:off x="0" y="0"/>
-          <a:ext cx="0" cy="0"/>
-          <a:chOff x="0" y="0"/>
-          <a:chExt cx="0" cy="0"/>
-        </a:xfrm>
-      </p:grpSpPr>
-      <p:sp>
-        <p:nvSpPr>
-          <p:cNvPr id="2" name="Title 1">
-            <a:extLst>
-              <a:ext uri="{FF2B5EF4-FFF2-40B4-BE49-F238E27FC236}">
-                <a16:creationId xmlns:a16="http://schemas.microsoft.com/office/drawing/2014/main" id="{69156C31-3711-45F0-B9C1-DFDAA5F560DD}"/>
-              </a:ext>
-            </a:extLst>
-          </p:cNvPr>
-          <p:cNvSpPr>
-            <a:spLocks noGrp="1"/>
-          </p:cNvSpPr>
-          <p:nvPr>
-            <p:ph type="title"/>
-          </p:nvPr>
-        </p:nvSpPr>
-        <p:spPr/>
-        <p:txBody>
-          <a:bodyPr/>
-          <a:lstStyle/>
-          <a:p>
-            <a:pPr algn="ctr"/>
-            <a:r>
-              <a:rPr lang="en-GB" dirty="0"/>
-              <a:t>What is Version Control?</a:t>
-            </a:r>
-          </a:p>
-        </p:txBody>
-      </p:sp>
-      <p:sp>
-        <p:nvSpPr>
-          <p:cNvPr id="7" name="TextBox 6">
-            <a:extLst>
-              <a:ext uri="{FF2B5EF4-FFF2-40B4-BE49-F238E27FC236}">
-                <a16:creationId xmlns:a16="http://schemas.microsoft.com/office/drawing/2014/main" id="{B2AC47F3-9CE2-7E92-C558-00565A705012}"/>
-              </a:ext>
-            </a:extLst>
-          </p:cNvPr>
-          <p:cNvSpPr txBox="1"/>
-          <p:nvPr/>
-        </p:nvSpPr>
-        <p:spPr>
-          <a:xfrm>
-            <a:off x="1971728" y="2188085"/>
-            <a:ext cx="7684655" cy="830997"/>
-          </a:xfrm>
-          <a:prstGeom prst="rect">
-            <a:avLst/>
-          </a:prstGeom>
-          <a:noFill/>
-        </p:spPr>
-        <p:txBody>
-          <a:bodyPr wrap="square">
-            <a:spAutoFit/>
-          </a:bodyPr>
-          <a:lstStyle/>
-          <a:p>
-            <a:r>
-              <a:rPr lang="en-GB" sz="2400" dirty="0"/>
-              <a:t>‘… a system that records changes to a file or set of files over time so that you can recall specific versions later’ </a:t>
-            </a:r>
-            <a:r>
-              <a:rPr lang="en-GB" sz="2400" baseline="30000" dirty="0"/>
-              <a:t>1</a:t>
-            </a:r>
-            <a:endParaRPr lang="en-GB" sz="2400" dirty="0"/>
-          </a:p>
-        </p:txBody>
-      </p:sp>
-      <p:sp>
-        <p:nvSpPr>
-          <p:cNvPr id="8" name="TextBox 7">
-            <a:extLst>
-              <a:ext uri="{FF2B5EF4-FFF2-40B4-BE49-F238E27FC236}">
-                <a16:creationId xmlns:a16="http://schemas.microsoft.com/office/drawing/2014/main" id="{8894954C-4C0F-5D7D-90F6-A313EEC9DBA7}"/>
-              </a:ext>
-            </a:extLst>
-          </p:cNvPr>
-          <p:cNvSpPr txBox="1"/>
-          <p:nvPr/>
-        </p:nvSpPr>
-        <p:spPr>
-          <a:xfrm>
-            <a:off x="2678546" y="4327088"/>
-            <a:ext cx="4246832" cy="1384995"/>
-          </a:xfrm>
-          <a:prstGeom prst="rect">
-            <a:avLst/>
-          </a:prstGeom>
-          <a:noFill/>
-        </p:spPr>
-        <p:txBody>
-          <a:bodyPr wrap="square" rtlCol="0">
-            <a:spAutoFit/>
-          </a:bodyPr>
-          <a:lstStyle/>
-          <a:p>
-            <a:endParaRPr lang="en-GB" baseline="30000" dirty="0"/>
-          </a:p>
-          <a:p>
-            <a:r>
-              <a:rPr lang="en-GB" dirty="0"/>
-              <a:t>Pro Git book, available online (free!)</a:t>
-            </a:r>
-          </a:p>
-          <a:p>
-            <a:endParaRPr lang="en-GB" dirty="0"/>
-          </a:p>
-          <a:p>
-            <a:r>
-              <a:rPr lang="en-GB" baseline="30000" dirty="0"/>
-              <a:t>1 </a:t>
-            </a:r>
-            <a:r>
-              <a:rPr lang="en-GB" dirty="0">
-                <a:hlinkClick r:id="rId2"/>
-              </a:rPr>
-              <a:t>https://git-scm.com/book/en/v2/</a:t>
-            </a:r>
-            <a:endParaRPr lang="en-GB" dirty="0"/>
-          </a:p>
-          <a:p>
-            <a:endParaRPr lang="en-GB" dirty="0"/>
-          </a:p>
-        </p:txBody>
-      </p:sp>
-      <p:pic>
-        <p:nvPicPr>
-          <p:cNvPr id="9" name="Picture 8" descr="Pro Git book cover">
-            <a:extLst>
-              <a:ext uri="{FF2B5EF4-FFF2-40B4-BE49-F238E27FC236}">
-                <a16:creationId xmlns:a16="http://schemas.microsoft.com/office/drawing/2014/main" id="{39D4B845-41A6-03C9-87EA-559AB2773641}"/>
-              </a:ext>
-            </a:extLst>
-          </p:cNvPr>
-          <p:cNvPicPr>
-            <a:picLocks noChangeAspect="1"/>
-          </p:cNvPicPr>
-          <p:nvPr/>
-        </p:nvPicPr>
-        <p:blipFill>
-          <a:blip r:embed="rId3">
-            <a:extLst>
-              <a:ext uri="{28A0092B-C50C-407E-A947-70E740481C1C}">
-                <a14:useLocalDpi xmlns:a14="http://schemas.microsoft.com/office/drawing/2010/main" val="0"/>
-              </a:ext>
-            </a:extLst>
-          </a:blip>
-          <a:stretch>
-            <a:fillRect/>
-          </a:stretch>
-        </p:blipFill>
-        <p:spPr>
-          <a:xfrm>
-            <a:off x="7500273" y="3838919"/>
-            <a:ext cx="1788890" cy="2361334"/>
-          </a:xfrm>
-          <a:prstGeom prst="rect">
-            <a:avLst/>
-          </a:prstGeom>
-        </p:spPr>
-      </p:pic>
-    </p:spTree>
-    <p:extLst>
-      <p:ext uri="{BB962C8B-B14F-4D97-AF65-F5344CB8AC3E}">
-        <p14:creationId xmlns:p14="http://schemas.microsoft.com/office/powerpoint/2010/main" val="1221217987"/>
-      </p:ext>
-    </p:extLst>
-  </p:cSld>
-  <p:clrMapOvr>
-    <a:masterClrMapping/>
-  </p:clrMapOvr>
-</p:sld>
-</file>
-
-<file path=ppt/slides/slide40.xml><?xml version="1.0" encoding="utf-8"?>
+<file path=ppt/slides/slide41.xml><?xml version="1.0" encoding="utf-8"?>
 <p:sld xmlns:a="http://schemas.openxmlformats.org/drawingml/2006/main" xmlns:r="http://schemas.openxmlformats.org/officeDocument/2006/relationships" xmlns:p="http://schemas.openxmlformats.org/presentationml/2006/main">
   <p:cSld>
     <p:spTree>
@@ -31211,207 +31398,6 @@
 </p:sld>
 </file>
 
-<file path=ppt/slides/slide41.xml><?xml version="1.0" encoding="utf-8"?>
-<p:sld xmlns:a="http://schemas.openxmlformats.org/drawingml/2006/main" xmlns:r="http://schemas.openxmlformats.org/officeDocument/2006/relationships" xmlns:p="http://schemas.openxmlformats.org/presentationml/2006/main">
-  <p:cSld>
-    <p:spTree>
-      <p:nvGrpSpPr>
-        <p:cNvPr id="1" name=""/>
-        <p:cNvGrpSpPr/>
-        <p:nvPr/>
-      </p:nvGrpSpPr>
-      <p:grpSpPr>
-        <a:xfrm>
-          <a:off x="0" y="0"/>
-          <a:ext cx="0" cy="0"/>
-          <a:chOff x="0" y="0"/>
-          <a:chExt cx="0" cy="0"/>
-        </a:xfrm>
-      </p:grpSpPr>
-      <p:sp>
-        <p:nvSpPr>
-          <p:cNvPr id="2" name="Title 1">
-            <a:extLst>
-              <a:ext uri="{FF2B5EF4-FFF2-40B4-BE49-F238E27FC236}">
-                <a16:creationId xmlns:a16="http://schemas.microsoft.com/office/drawing/2014/main" id="{93D04027-176D-7C37-0665-3ED3C4B7E0FD}"/>
-              </a:ext>
-            </a:extLst>
-          </p:cNvPr>
-          <p:cNvSpPr>
-            <a:spLocks noGrp="1"/>
-          </p:cNvSpPr>
-          <p:nvPr>
-            <p:ph type="title"/>
-          </p:nvPr>
-        </p:nvSpPr>
-        <p:spPr/>
-        <p:txBody>
-          <a:bodyPr/>
-          <a:lstStyle/>
-          <a:p>
-            <a:pPr algn="ctr"/>
-            <a:r>
-              <a:rPr lang="en-GB" dirty="0"/>
-              <a:t>Slash and Backslash</a:t>
-            </a:r>
-          </a:p>
-        </p:txBody>
-      </p:sp>
-      <p:sp>
-        <p:nvSpPr>
-          <p:cNvPr id="3" name="Content Placeholder 2">
-            <a:extLst>
-              <a:ext uri="{FF2B5EF4-FFF2-40B4-BE49-F238E27FC236}">
-                <a16:creationId xmlns:a16="http://schemas.microsoft.com/office/drawing/2014/main" id="{144233E6-8DF7-7DE7-7AD6-44903869EAF5}"/>
-              </a:ext>
-            </a:extLst>
-          </p:cNvPr>
-          <p:cNvSpPr>
-            <a:spLocks noGrp="1"/>
-          </p:cNvSpPr>
-          <p:nvPr>
-            <p:ph idx="1"/>
-          </p:nvPr>
-        </p:nvSpPr>
-        <p:spPr>
-          <a:xfrm>
-            <a:off x="1881054" y="1808534"/>
-            <a:ext cx="8573301" cy="4351338"/>
-          </a:xfrm>
-        </p:spPr>
-        <p:txBody>
-          <a:bodyPr>
-            <a:normAutofit fontScale="92500" lnSpcReduction="20000"/>
-          </a:bodyPr>
-          <a:lstStyle/>
-          <a:p>
-            <a:r>
-              <a:rPr lang="en-GB" sz="2400" dirty="0"/>
-              <a:t>Matrix multiplication is not commutative (generally AB ≠ BA) </a:t>
-            </a:r>
-          </a:p>
-          <a:p>
-            <a:endParaRPr lang="en-GB" sz="2400" dirty="0"/>
-          </a:p>
-          <a:p>
-            <a:r>
-              <a:rPr lang="en-GB" sz="2400" dirty="0"/>
-              <a:t>AX = B and XA = B represent different systems of equations for X</a:t>
-            </a:r>
-          </a:p>
-          <a:p>
-            <a:pPr marL="0" indent="0">
-              <a:buNone/>
-            </a:pPr>
-            <a:endParaRPr lang="en-GB" sz="2400" dirty="0"/>
-          </a:p>
-          <a:p>
-            <a:r>
-              <a:rPr lang="en-GB" sz="2400" dirty="0"/>
-              <a:t>MATLAB uses / and \ to distinguish between these:</a:t>
-            </a:r>
-          </a:p>
-          <a:p>
-            <a:endParaRPr lang="en-GB" sz="2400" dirty="0"/>
-          </a:p>
-          <a:p>
-            <a:pPr marL="457200" lvl="1" indent="0">
-              <a:buNone/>
-            </a:pPr>
-            <a:r>
-              <a:rPr lang="en-GB" dirty="0">
-                <a:latin typeface="Courier New" panose="02070309020205020404" pitchFamily="49" charset="0"/>
-                <a:cs typeface="Courier New" panose="02070309020205020404" pitchFamily="49" charset="0"/>
-              </a:rPr>
-              <a:t>&gt;&gt; X = B/A    </a:t>
-            </a:r>
-            <a:r>
-              <a:rPr lang="en-GB" dirty="0">
-                <a:cs typeface="Courier New" panose="02070309020205020404" pitchFamily="49" charset="0"/>
-              </a:rPr>
-              <a:t>represents “solve the system XA = B”, while</a:t>
-            </a:r>
-          </a:p>
-          <a:p>
-            <a:pPr marL="457200" lvl="1" indent="0">
-              <a:buNone/>
-            </a:pPr>
-            <a:endParaRPr lang="en-GB" dirty="0">
-              <a:cs typeface="Courier New" panose="02070309020205020404" pitchFamily="49" charset="0"/>
-            </a:endParaRPr>
-          </a:p>
-          <a:p>
-            <a:pPr marL="457200" lvl="1" indent="0">
-              <a:buNone/>
-            </a:pPr>
-            <a:r>
-              <a:rPr lang="en-GB" dirty="0">
-                <a:latin typeface="Courier New" panose="02070309020205020404" pitchFamily="49" charset="0"/>
-                <a:cs typeface="Courier New" panose="02070309020205020404" pitchFamily="49" charset="0"/>
-              </a:rPr>
-              <a:t>&gt;&gt; X = B\A    </a:t>
-            </a:r>
-            <a:r>
-              <a:rPr lang="en-GB" dirty="0">
-                <a:cs typeface="Courier New" panose="02070309020205020404" pitchFamily="49" charset="0"/>
-              </a:rPr>
-              <a:t>represents “solve the system AX = B”</a:t>
-            </a:r>
-            <a:endParaRPr lang="en-GB" dirty="0">
-              <a:latin typeface="Courier New" panose="02070309020205020404" pitchFamily="49" charset="0"/>
-              <a:cs typeface="Courier New" panose="02070309020205020404" pitchFamily="49" charset="0"/>
-            </a:endParaRPr>
-          </a:p>
-          <a:p>
-            <a:pPr marL="457200" lvl="1" indent="0">
-              <a:buNone/>
-            </a:pPr>
-            <a:endParaRPr lang="en-GB" sz="1600" dirty="0">
-              <a:latin typeface="Courier New" panose="02070309020205020404" pitchFamily="49" charset="0"/>
-              <a:cs typeface="Courier New" panose="02070309020205020404" pitchFamily="49" charset="0"/>
-            </a:endParaRPr>
-          </a:p>
-          <a:p>
-            <a:pPr marL="457200" lvl="1" indent="0">
-              <a:buNone/>
-            </a:pPr>
-            <a:endParaRPr lang="en-GB" sz="1600" dirty="0">
-              <a:latin typeface="Courier New" panose="02070309020205020404" pitchFamily="49" charset="0"/>
-              <a:cs typeface="Courier New" panose="02070309020205020404" pitchFamily="49" charset="0"/>
-            </a:endParaRPr>
-          </a:p>
-          <a:p>
-            <a:pPr marL="457200" lvl="1" indent="0">
-              <a:buNone/>
-            </a:pPr>
-            <a:endParaRPr lang="en-GB" sz="1600" dirty="0">
-              <a:cs typeface="Courier New" panose="02070309020205020404" pitchFamily="49" charset="0"/>
-            </a:endParaRPr>
-          </a:p>
-          <a:p>
-            <a:pPr marL="0" indent="0">
-              <a:buNone/>
-            </a:pPr>
-            <a:r>
-              <a:rPr lang="en-GB" dirty="0"/>
-              <a:t>  </a:t>
-            </a:r>
-          </a:p>
-        </p:txBody>
-      </p:sp>
-    </p:spTree>
-    <p:extLst>
-      <p:ext uri="{BB962C8B-B14F-4D97-AF65-F5344CB8AC3E}">
-        <p14:creationId xmlns:p14="http://schemas.microsoft.com/office/powerpoint/2010/main" val="2718025386"/>
-      </p:ext>
-    </p:extLst>
-  </p:cSld>
-  <p:clrMapOvr>
-    <a:masterClrMapping/>
-  </p:clrMapOvr>
-</p:sld>
-</file>
-
 <file path=ppt/slides/slide42.xml><?xml version="1.0" encoding="utf-8"?>
 <p:sld xmlns:a="http://schemas.openxmlformats.org/drawingml/2006/main" xmlns:r="http://schemas.openxmlformats.org/officeDocument/2006/relationships" xmlns:p="http://schemas.openxmlformats.org/presentationml/2006/main">
   <p:cSld>
@@ -31431,6 +31417,207 @@
       </p:grpSpPr>
       <p:sp>
         <p:nvSpPr>
+          <p:cNvPr id="2" name="Title 1">
+            <a:extLst>
+              <a:ext uri="{FF2B5EF4-FFF2-40B4-BE49-F238E27FC236}">
+                <a16:creationId xmlns:a16="http://schemas.microsoft.com/office/drawing/2014/main" id="{93D04027-176D-7C37-0665-3ED3C4B7E0FD}"/>
+              </a:ext>
+            </a:extLst>
+          </p:cNvPr>
+          <p:cNvSpPr>
+            <a:spLocks noGrp="1"/>
+          </p:cNvSpPr>
+          <p:nvPr>
+            <p:ph type="title"/>
+          </p:nvPr>
+        </p:nvSpPr>
+        <p:spPr/>
+        <p:txBody>
+          <a:bodyPr/>
+          <a:lstStyle/>
+          <a:p>
+            <a:pPr algn="ctr"/>
+            <a:r>
+              <a:rPr lang="en-GB" dirty="0"/>
+              <a:t>Slash and Backslash</a:t>
+            </a:r>
+          </a:p>
+        </p:txBody>
+      </p:sp>
+      <p:sp>
+        <p:nvSpPr>
+          <p:cNvPr id="3" name="Content Placeholder 2">
+            <a:extLst>
+              <a:ext uri="{FF2B5EF4-FFF2-40B4-BE49-F238E27FC236}">
+                <a16:creationId xmlns:a16="http://schemas.microsoft.com/office/drawing/2014/main" id="{144233E6-8DF7-7DE7-7AD6-44903869EAF5}"/>
+              </a:ext>
+            </a:extLst>
+          </p:cNvPr>
+          <p:cNvSpPr>
+            <a:spLocks noGrp="1"/>
+          </p:cNvSpPr>
+          <p:nvPr>
+            <p:ph idx="1"/>
+          </p:nvPr>
+        </p:nvSpPr>
+        <p:spPr>
+          <a:xfrm>
+            <a:off x="1881054" y="1808534"/>
+            <a:ext cx="8573301" cy="4351338"/>
+          </a:xfrm>
+        </p:spPr>
+        <p:txBody>
+          <a:bodyPr>
+            <a:normAutofit fontScale="92500" lnSpcReduction="20000"/>
+          </a:bodyPr>
+          <a:lstStyle/>
+          <a:p>
+            <a:r>
+              <a:rPr lang="en-GB" sz="2400" dirty="0"/>
+              <a:t>Matrix multiplication is not commutative (generally AB ≠ BA) </a:t>
+            </a:r>
+          </a:p>
+          <a:p>
+            <a:endParaRPr lang="en-GB" sz="2400" dirty="0"/>
+          </a:p>
+          <a:p>
+            <a:r>
+              <a:rPr lang="en-GB" sz="2400" dirty="0"/>
+              <a:t>AX = B and XA = B represent different systems of equations for X</a:t>
+            </a:r>
+          </a:p>
+          <a:p>
+            <a:pPr marL="0" indent="0">
+              <a:buNone/>
+            </a:pPr>
+            <a:endParaRPr lang="en-GB" sz="2400" dirty="0"/>
+          </a:p>
+          <a:p>
+            <a:r>
+              <a:rPr lang="en-GB" sz="2400" dirty="0"/>
+              <a:t>MATLAB uses / and \ to distinguish between these:</a:t>
+            </a:r>
+          </a:p>
+          <a:p>
+            <a:endParaRPr lang="en-GB" sz="2400" dirty="0"/>
+          </a:p>
+          <a:p>
+            <a:pPr marL="457200" lvl="1" indent="0">
+              <a:buNone/>
+            </a:pPr>
+            <a:r>
+              <a:rPr lang="en-GB" dirty="0">
+                <a:latin typeface="Courier New" panose="02070309020205020404" pitchFamily="49" charset="0"/>
+                <a:cs typeface="Courier New" panose="02070309020205020404" pitchFamily="49" charset="0"/>
+              </a:rPr>
+              <a:t>&gt;&gt; X = B/A    </a:t>
+            </a:r>
+            <a:r>
+              <a:rPr lang="en-GB" dirty="0">
+                <a:cs typeface="Courier New" panose="02070309020205020404" pitchFamily="49" charset="0"/>
+              </a:rPr>
+              <a:t>represents “solve the system XA = B”, while</a:t>
+            </a:r>
+          </a:p>
+          <a:p>
+            <a:pPr marL="457200" lvl="1" indent="0">
+              <a:buNone/>
+            </a:pPr>
+            <a:endParaRPr lang="en-GB" dirty="0">
+              <a:cs typeface="Courier New" panose="02070309020205020404" pitchFamily="49" charset="0"/>
+            </a:endParaRPr>
+          </a:p>
+          <a:p>
+            <a:pPr marL="457200" lvl="1" indent="0">
+              <a:buNone/>
+            </a:pPr>
+            <a:r>
+              <a:rPr lang="en-GB" dirty="0">
+                <a:latin typeface="Courier New" panose="02070309020205020404" pitchFamily="49" charset="0"/>
+                <a:cs typeface="Courier New" panose="02070309020205020404" pitchFamily="49" charset="0"/>
+              </a:rPr>
+              <a:t>&gt;&gt; X = B\A    </a:t>
+            </a:r>
+            <a:r>
+              <a:rPr lang="en-GB" dirty="0">
+                <a:cs typeface="Courier New" panose="02070309020205020404" pitchFamily="49" charset="0"/>
+              </a:rPr>
+              <a:t>represents “solve the system AX = B”</a:t>
+            </a:r>
+            <a:endParaRPr lang="en-GB" dirty="0">
+              <a:latin typeface="Courier New" panose="02070309020205020404" pitchFamily="49" charset="0"/>
+              <a:cs typeface="Courier New" panose="02070309020205020404" pitchFamily="49" charset="0"/>
+            </a:endParaRPr>
+          </a:p>
+          <a:p>
+            <a:pPr marL="457200" lvl="1" indent="0">
+              <a:buNone/>
+            </a:pPr>
+            <a:endParaRPr lang="en-GB" sz="1600" dirty="0">
+              <a:latin typeface="Courier New" panose="02070309020205020404" pitchFamily="49" charset="0"/>
+              <a:cs typeface="Courier New" panose="02070309020205020404" pitchFamily="49" charset="0"/>
+            </a:endParaRPr>
+          </a:p>
+          <a:p>
+            <a:pPr marL="457200" lvl="1" indent="0">
+              <a:buNone/>
+            </a:pPr>
+            <a:endParaRPr lang="en-GB" sz="1600" dirty="0">
+              <a:latin typeface="Courier New" panose="02070309020205020404" pitchFamily="49" charset="0"/>
+              <a:cs typeface="Courier New" panose="02070309020205020404" pitchFamily="49" charset="0"/>
+            </a:endParaRPr>
+          </a:p>
+          <a:p>
+            <a:pPr marL="457200" lvl="1" indent="0">
+              <a:buNone/>
+            </a:pPr>
+            <a:endParaRPr lang="en-GB" sz="1600" dirty="0">
+              <a:cs typeface="Courier New" panose="02070309020205020404" pitchFamily="49" charset="0"/>
+            </a:endParaRPr>
+          </a:p>
+          <a:p>
+            <a:pPr marL="0" indent="0">
+              <a:buNone/>
+            </a:pPr>
+            <a:r>
+              <a:rPr lang="en-GB" dirty="0"/>
+              <a:t>  </a:t>
+            </a:r>
+          </a:p>
+        </p:txBody>
+      </p:sp>
+    </p:spTree>
+    <p:extLst>
+      <p:ext uri="{BB962C8B-B14F-4D97-AF65-F5344CB8AC3E}">
+        <p14:creationId xmlns:p14="http://schemas.microsoft.com/office/powerpoint/2010/main" val="2718025386"/>
+      </p:ext>
+    </p:extLst>
+  </p:cSld>
+  <p:clrMapOvr>
+    <a:masterClrMapping/>
+  </p:clrMapOvr>
+</p:sld>
+</file>
+
+<file path=ppt/slides/slide43.xml><?xml version="1.0" encoding="utf-8"?>
+<p:sld xmlns:a="http://schemas.openxmlformats.org/drawingml/2006/main" xmlns:r="http://schemas.openxmlformats.org/officeDocument/2006/relationships" xmlns:p="http://schemas.openxmlformats.org/presentationml/2006/main">
+  <p:cSld>
+    <p:spTree>
+      <p:nvGrpSpPr>
+        <p:cNvPr id="1" name=""/>
+        <p:cNvGrpSpPr/>
+        <p:nvPr/>
+      </p:nvGrpSpPr>
+      <p:grpSpPr>
+        <a:xfrm>
+          <a:off x="0" y="0"/>
+          <a:ext cx="0" cy="0"/>
+          <a:chOff x="0" y="0"/>
+          <a:chExt cx="0" cy="0"/>
+        </a:xfrm>
+      </p:grpSpPr>
+      <p:sp>
+        <p:nvSpPr>
           <p:cNvPr id="2" name="Title 1"/>
           <p:cNvSpPr>
             <a:spLocks noGrp="1"/>
@@ -31482,7 +31669,7 @@
                 </a:solidFill>
               </a:rPr>
               <a:pPr/>
-              <a:t>42</a:t>
+              <a:t>43</a:t>
             </a:fld>
             <a:endParaRPr lang="en-GB">
               <a:solidFill>
@@ -32003,7 +32190,7 @@
 </p:sld>
 </file>
 
-<file path=ppt/slides/slide43.xml><?xml version="1.0" encoding="utf-8"?>
+<file path=ppt/slides/slide44.xml><?xml version="1.0" encoding="utf-8"?>
 <p:sld xmlns:a="http://schemas.openxmlformats.org/drawingml/2006/main" xmlns:r="http://schemas.openxmlformats.org/officeDocument/2006/relationships" xmlns:p="http://schemas.openxmlformats.org/presentationml/2006/main">
   <p:cSld>
     <p:spTree>
@@ -32044,7 +32231,7 @@
                 </a:solidFill>
               </a:rPr>
               <a:pPr/>
-              <a:t>43</a:t>
+              <a:t>44</a:t>
             </a:fld>
             <a:endParaRPr lang="en-GB">
               <a:solidFill>
@@ -32749,7 +32936,7 @@
 </p:sld>
 </file>
 
-<file path=ppt/slides/slide44.xml><?xml version="1.0" encoding="utf-8"?>
+<file path=ppt/slides/slide45.xml><?xml version="1.0" encoding="utf-8"?>
 <p:sld xmlns:a="http://schemas.openxmlformats.org/drawingml/2006/main" xmlns:r="http://schemas.openxmlformats.org/officeDocument/2006/relationships" xmlns:p="http://schemas.openxmlformats.org/presentationml/2006/main">
   <p:cSld>
     <p:spTree>
@@ -33369,7 +33556,7 @@
 </p:sld>
 </file>
 
-<file path=ppt/slides/slide45.xml><?xml version="1.0" encoding="utf-8"?>
+<file path=ppt/slides/slide46.xml><?xml version="1.0" encoding="utf-8"?>
 <p:sld xmlns:a="http://schemas.openxmlformats.org/drawingml/2006/main" xmlns:r="http://schemas.openxmlformats.org/officeDocument/2006/relationships" xmlns:p="http://schemas.openxmlformats.org/presentationml/2006/main">
   <p:cSld>
     <p:spTree>
@@ -33432,7 +33619,7 @@
           <a:p>
             <a:fld id="{83730267-60C2-4514-997F-6A8804439442}" type="slidenum">
               <a:rPr lang="en-GB" smtClean="0"/>
-              <a:t>45</a:t>
+              <a:t>46</a:t>
             </a:fld>
             <a:endParaRPr lang="en-GB"/>
           </a:p>
@@ -33863,149 +34050,6 @@
 </p:sld>
 </file>
 
-<file path=ppt/slides/slide46.xml><?xml version="1.0" encoding="utf-8"?>
-<p:sld xmlns:a="http://schemas.openxmlformats.org/drawingml/2006/main" xmlns:r="http://schemas.openxmlformats.org/officeDocument/2006/relationships" xmlns:p="http://schemas.openxmlformats.org/presentationml/2006/main">
-  <p:cSld>
-    <p:spTree>
-      <p:nvGrpSpPr>
-        <p:cNvPr id="1" name=""/>
-        <p:cNvGrpSpPr/>
-        <p:nvPr/>
-      </p:nvGrpSpPr>
-      <p:grpSpPr>
-        <a:xfrm>
-          <a:off x="0" y="0"/>
-          <a:ext cx="0" cy="0"/>
-          <a:chOff x="0" y="0"/>
-          <a:chExt cx="0" cy="0"/>
-        </a:xfrm>
-      </p:grpSpPr>
-      <p:sp>
-        <p:nvSpPr>
-          <p:cNvPr id="2" name="Title 1">
-            <a:extLst>
-              <a:ext uri="{FF2B5EF4-FFF2-40B4-BE49-F238E27FC236}">
-                <a16:creationId xmlns:a16="http://schemas.microsoft.com/office/drawing/2014/main" id="{6526419F-0E68-9C26-274E-F6801E82F293}"/>
-              </a:ext>
-            </a:extLst>
-          </p:cNvPr>
-          <p:cNvSpPr>
-            <a:spLocks noGrp="1"/>
-          </p:cNvSpPr>
-          <p:nvPr>
-            <p:ph type="title"/>
-          </p:nvPr>
-        </p:nvSpPr>
-        <p:spPr/>
-        <p:txBody>
-          <a:bodyPr/>
-          <a:lstStyle/>
-          <a:p>
-            <a:r>
-              <a:rPr lang="en-GB" dirty="0"/>
-              <a:t>Software Testing</a:t>
-            </a:r>
-          </a:p>
-        </p:txBody>
-      </p:sp>
-      <p:sp>
-        <p:nvSpPr>
-          <p:cNvPr id="3" name="Content Placeholder 2">
-            <a:extLst>
-              <a:ext uri="{FF2B5EF4-FFF2-40B4-BE49-F238E27FC236}">
-                <a16:creationId xmlns:a16="http://schemas.microsoft.com/office/drawing/2014/main" id="{4795FF2B-4679-C340-3F12-BED74CA25425}"/>
-              </a:ext>
-            </a:extLst>
-          </p:cNvPr>
-          <p:cNvSpPr>
-            <a:spLocks noGrp="1"/>
-          </p:cNvSpPr>
-          <p:nvPr>
-            <p:ph idx="1"/>
-          </p:nvPr>
-        </p:nvSpPr>
-        <p:spPr/>
-        <p:txBody>
-          <a:bodyPr/>
-          <a:lstStyle/>
-          <a:p>
-            <a:pPr marL="0" indent="0">
-              <a:buNone/>
-            </a:pPr>
-            <a:r>
-              <a:rPr lang="en-GB" dirty="0"/>
-              <a:t>Please take a look at this blog before the session tomorrow:</a:t>
-            </a:r>
-          </a:p>
-          <a:p>
-            <a:pPr marL="0" indent="0">
-              <a:buNone/>
-            </a:pPr>
-            <a:r>
-              <a:rPr lang="en-GB" dirty="0">
-                <a:hlinkClick r:id="rId2"/>
-              </a:rPr>
-              <a:t>A Brief Introduction to Software Testing</a:t>
-            </a:r>
-            <a:endParaRPr lang="en-GB" dirty="0"/>
-          </a:p>
-        </p:txBody>
-      </p:sp>
-      <p:sp>
-        <p:nvSpPr>
-          <p:cNvPr id="4" name="Slide Number Placeholder 3">
-            <a:extLst>
-              <a:ext uri="{FF2B5EF4-FFF2-40B4-BE49-F238E27FC236}">
-                <a16:creationId xmlns:a16="http://schemas.microsoft.com/office/drawing/2014/main" id="{AF86B5FF-55B2-D4F8-CA74-07D9F383239A}"/>
-              </a:ext>
-            </a:extLst>
-          </p:cNvPr>
-          <p:cNvSpPr>
-            <a:spLocks noGrp="1"/>
-          </p:cNvSpPr>
-          <p:nvPr>
-            <p:ph type="sldNum" sz="quarter" idx="12"/>
-          </p:nvPr>
-        </p:nvSpPr>
-        <p:spPr/>
-        <p:txBody>
-          <a:bodyPr/>
-          <a:lstStyle/>
-          <a:p>
-            <a:fld id="{83730267-60C2-4514-997F-6A8804439442}" type="slidenum">
-              <a:rPr lang="en-GB" smtClean="0">
-                <a:solidFill>
-                  <a:prstClr val="black">
-                    <a:tint val="75000"/>
-                  </a:prstClr>
-                </a:solidFill>
-              </a:rPr>
-              <a:pPr/>
-              <a:t>46</a:t>
-            </a:fld>
-            <a:endParaRPr lang="en-GB">
-              <a:solidFill>
-                <a:prstClr val="black">
-                  <a:tint val="75000"/>
-                </a:prstClr>
-              </a:solidFill>
-            </a:endParaRPr>
-          </a:p>
-        </p:txBody>
-      </p:sp>
-    </p:spTree>
-    <p:extLst>
-      <p:ext uri="{BB962C8B-B14F-4D97-AF65-F5344CB8AC3E}">
-        <p14:creationId xmlns:p14="http://schemas.microsoft.com/office/powerpoint/2010/main" val="2224768003"/>
-      </p:ext>
-    </p:extLst>
-  </p:cSld>
-  <p:clrMapOvr>
-    <a:masterClrMapping/>
-  </p:clrMapOvr>
-</p:sld>
-</file>
-
 <file path=ppt/slides/slide47.xml><?xml version="1.0" encoding="utf-8"?>
 <p:sld xmlns:a="http://schemas.openxmlformats.org/drawingml/2006/main" xmlns:r="http://schemas.openxmlformats.org/officeDocument/2006/relationships" xmlns:p="http://schemas.openxmlformats.org/presentationml/2006/main">
   <p:cSld>
@@ -34028,7 +34072,7 @@
           <p:cNvPr id="2" name="Title 1">
             <a:extLst>
               <a:ext uri="{FF2B5EF4-FFF2-40B4-BE49-F238E27FC236}">
-                <a16:creationId xmlns:a16="http://schemas.microsoft.com/office/drawing/2014/main" id="{0205CA92-26BA-C99F-E8BA-840A9551647E}"/>
+                <a16:creationId xmlns:a16="http://schemas.microsoft.com/office/drawing/2014/main" id="{DE8F5683-3E3D-0720-27E1-975334317D56}"/>
               </a:ext>
             </a:extLst>
           </p:cNvPr>
@@ -34046,7 +34090,7 @@
           <a:p>
             <a:r>
               <a:rPr lang="en-GB" dirty="0"/>
-              <a:t>Software Testing</a:t>
+              <a:t>What is AI?</a:t>
             </a:r>
           </a:p>
         </p:txBody>
@@ -34056,7 +34100,7 @@
           <p:cNvPr id="3" name="Slide Number Placeholder 2">
             <a:extLst>
               <a:ext uri="{FF2B5EF4-FFF2-40B4-BE49-F238E27FC236}">
-                <a16:creationId xmlns:a16="http://schemas.microsoft.com/office/drawing/2014/main" id="{B6F8BE1A-2466-3F24-2684-11CE2A09FB21}"/>
+                <a16:creationId xmlns:a16="http://schemas.microsoft.com/office/drawing/2014/main" id="{BE3B3F7E-3BDB-750A-7BBD-0D14F1915DF2}"/>
               </a:ext>
             </a:extLst>
           </p:cNvPr>
@@ -34095,10 +34139,78 @@
       </p:sp>
       <p:pic>
         <p:nvPicPr>
-          <p:cNvPr id="6" name="Picture 5" descr="A qr code with black squares&#10;&#10;Description automatically generated with low confidence">
+          <p:cNvPr id="4" name="Picture 3">
             <a:extLst>
               <a:ext uri="{FF2B5EF4-FFF2-40B4-BE49-F238E27FC236}">
-                <a16:creationId xmlns:a16="http://schemas.microsoft.com/office/drawing/2014/main" id="{3A8A9B7C-999C-A7A8-4CB2-B3C7D2DD3139}"/>
+                <a16:creationId xmlns:a16="http://schemas.microsoft.com/office/drawing/2014/main" id="{A4C80836-91D8-D935-FBB3-62BDFEC5C31D}"/>
+              </a:ext>
+            </a:extLst>
+          </p:cNvPr>
+          <p:cNvPicPr>
+            <a:picLocks noChangeAspect="1"/>
+          </p:cNvPicPr>
+          <p:nvPr/>
+        </p:nvPicPr>
+        <p:blipFill rotWithShape="1">
+          <a:blip r:embed="rId2"/>
+          <a:srcRect t="13526"/>
+          <a:stretch/>
+        </p:blipFill>
+        <p:spPr>
+          <a:xfrm>
+            <a:off x="183574" y="1628031"/>
+            <a:ext cx="9976426" cy="5229969"/>
+          </a:xfrm>
+          <a:prstGeom prst="rect">
+            <a:avLst/>
+          </a:prstGeom>
+        </p:spPr>
+      </p:pic>
+      <p:sp>
+        <p:nvSpPr>
+          <p:cNvPr id="6" name="TextBox 5">
+            <a:extLst>
+              <a:ext uri="{FF2B5EF4-FFF2-40B4-BE49-F238E27FC236}">
+                <a16:creationId xmlns:a16="http://schemas.microsoft.com/office/drawing/2014/main" id="{5B4EE51D-6B9B-A970-6E5E-115499869621}"/>
+              </a:ext>
+            </a:extLst>
+          </p:cNvPr>
+          <p:cNvSpPr txBox="1"/>
+          <p:nvPr/>
+        </p:nvSpPr>
+        <p:spPr>
+          <a:xfrm>
+            <a:off x="119268" y="1232972"/>
+            <a:ext cx="10970339" cy="369332"/>
+          </a:xfrm>
+          <a:prstGeom prst="rect">
+            <a:avLst/>
+          </a:prstGeom>
+          <a:noFill/>
+        </p:spPr>
+        <p:txBody>
+          <a:bodyPr wrap="square">
+            <a:spAutoFit/>
+          </a:bodyPr>
+          <a:lstStyle/>
+          <a:p>
+            <a:r>
+              <a:rPr lang="en-GB" b="0" i="0" dirty="0">
+                <a:effectLst/>
+                <a:latin typeface="arial" panose="020B0604020202020204" pitchFamily="34" charset="0"/>
+              </a:rPr>
+              <a:t>AI enables computers and machines to simulate human intelligence and problem-solving capabilities.</a:t>
+            </a:r>
+            <a:endParaRPr lang="en-GB" dirty="0"/>
+          </a:p>
+        </p:txBody>
+      </p:sp>
+      <p:pic>
+        <p:nvPicPr>
+          <p:cNvPr id="8" name="Picture 7">
+            <a:extLst>
+              <a:ext uri="{FF2B5EF4-FFF2-40B4-BE49-F238E27FC236}">
+                <a16:creationId xmlns:a16="http://schemas.microsoft.com/office/drawing/2014/main" id="{4B8BD4E0-FDB5-1A74-1DE1-E5E4E97B36D1}"/>
               </a:ext>
             </a:extLst>
           </p:cNvPr>
@@ -34108,92 +34220,25 @@
           <p:nvPr/>
         </p:nvPicPr>
         <p:blipFill>
-          <a:blip r:embed="rId2" cstate="print">
-            <a:extLst>
-              <a:ext uri="{28A0092B-C50C-407E-A947-70E740481C1C}">
-                <a14:useLocalDpi xmlns:a14="http://schemas.microsoft.com/office/drawing/2010/main" val="0"/>
-              </a:ext>
-            </a:extLst>
-          </a:blip>
+          <a:blip r:embed="rId3"/>
           <a:stretch>
             <a:fillRect/>
           </a:stretch>
         </p:blipFill>
         <p:spPr>
           <a:xfrm>
-            <a:off x="6549452" y="1768839"/>
-            <a:ext cx="3971499" cy="3971499"/>
+            <a:off x="9095943" y="1811333"/>
+            <a:ext cx="3096057" cy="1267002"/>
           </a:xfrm>
           <a:prstGeom prst="rect">
             <a:avLst/>
           </a:prstGeom>
         </p:spPr>
       </p:pic>
-      <p:sp>
-        <p:nvSpPr>
-          <p:cNvPr id="7" name="TextBox 6">
-            <a:extLst>
-              <a:ext uri="{FF2B5EF4-FFF2-40B4-BE49-F238E27FC236}">
-                <a16:creationId xmlns:a16="http://schemas.microsoft.com/office/drawing/2014/main" id="{06D11BCB-D72E-F6D9-DAB5-FF70E2770653}"/>
-              </a:ext>
-            </a:extLst>
-          </p:cNvPr>
-          <p:cNvSpPr txBox="1"/>
-          <p:nvPr/>
-        </p:nvSpPr>
-        <p:spPr>
-          <a:xfrm>
-            <a:off x="609600" y="1768839"/>
-            <a:ext cx="5777552" cy="3416320"/>
-          </a:xfrm>
-          <a:prstGeom prst="rect">
-            <a:avLst/>
-          </a:prstGeom>
-          <a:noFill/>
-        </p:spPr>
-        <p:txBody>
-          <a:bodyPr wrap="square" rtlCol="0">
-            <a:spAutoFit/>
-          </a:bodyPr>
-          <a:lstStyle/>
-          <a:p>
-            <a:r>
-              <a:rPr lang="en-GB" sz="3600" dirty="0"/>
-              <a:t>How do you test your code?</a:t>
-            </a:r>
-          </a:p>
-          <a:p>
-            <a:endParaRPr lang="en-GB" sz="3600" dirty="0"/>
-          </a:p>
-          <a:p>
-            <a:r>
-              <a:rPr lang="en-GB" sz="3600" dirty="0"/>
-              <a:t>How do you know it gives the right answers?</a:t>
-            </a:r>
-          </a:p>
-          <a:p>
-            <a:endParaRPr lang="en-GB" sz="3600" dirty="0"/>
-          </a:p>
-          <a:p>
-            <a:r>
-              <a:rPr lang="en-GB" sz="3600" dirty="0"/>
-              <a:t>Add your ideas to the </a:t>
-            </a:r>
-            <a:r>
-              <a:rPr lang="en-GB" sz="3600" dirty="0" err="1"/>
-              <a:t>padlet</a:t>
-            </a:r>
-            <a:r>
-              <a:rPr lang="en-GB" sz="3600" dirty="0"/>
-              <a:t>:</a:t>
-            </a:r>
-          </a:p>
-        </p:txBody>
-      </p:sp>
     </p:spTree>
     <p:extLst>
       <p:ext uri="{BB962C8B-B14F-4D97-AF65-F5344CB8AC3E}">
-        <p14:creationId xmlns:p14="http://schemas.microsoft.com/office/powerpoint/2010/main" val="441908946"/>
+        <p14:creationId xmlns:p14="http://schemas.microsoft.com/office/powerpoint/2010/main" val="4136546853"/>
       </p:ext>
     </p:extLst>
   </p:cSld>
@@ -34222,7 +34267,13 @@
       </p:grpSpPr>
       <p:sp>
         <p:nvSpPr>
-          <p:cNvPr id="2" name="Title 1"/>
+          <p:cNvPr id="2" name="Title 1">
+            <a:extLst>
+              <a:ext uri="{FF2B5EF4-FFF2-40B4-BE49-F238E27FC236}">
+                <a16:creationId xmlns:a16="http://schemas.microsoft.com/office/drawing/2014/main" id="{06F825B2-23B7-F74F-2D3F-9E4539F5524C}"/>
+              </a:ext>
+            </a:extLst>
+          </p:cNvPr>
           <p:cNvSpPr>
             <a:spLocks noGrp="1"/>
           </p:cNvSpPr>
@@ -34232,81 +34283,25 @@
         </p:nvSpPr>
         <p:spPr/>
         <p:txBody>
-          <a:bodyPr>
-            <a:normAutofit/>
-          </a:bodyPr>
+          <a:bodyPr/>
           <a:lstStyle/>
           <a:p>
             <a:r>
-              <a:rPr lang="en-GB" sz="3600" dirty="0"/>
-              <a:t>Debugging and Improving Performance</a:t>
-            </a:r>
-          </a:p>
-        </p:txBody>
-      </p:sp>
-      <p:sp>
-        <p:nvSpPr>
-          <p:cNvPr id="3" name="Content Placeholder 2"/>
-          <p:cNvSpPr>
-            <a:spLocks noGrp="1"/>
-          </p:cNvSpPr>
-          <p:nvPr>
-            <p:ph idx="1"/>
-          </p:nvPr>
-        </p:nvSpPr>
-        <p:spPr/>
-        <p:txBody>
-          <a:bodyPr>
-            <a:normAutofit/>
-          </a:bodyPr>
-          <a:lstStyle/>
-          <a:p>
-            <a:pPr marL="0" indent="0">
-              <a:buNone/>
-            </a:pPr>
-            <a:endParaRPr lang="en-GB" sz="2800" dirty="0"/>
-          </a:p>
-          <a:p>
-            <a:r>
-              <a:rPr lang="en-GB" sz="2800" dirty="0"/>
-              <a:t>Diagnosing problems</a:t>
-            </a:r>
-          </a:p>
-          <a:p>
-            <a:r>
-              <a:rPr lang="en-GB" sz="2800" dirty="0"/>
-              <a:t>Identifying common errors</a:t>
-            </a:r>
-          </a:p>
-          <a:p>
-            <a:r>
-              <a:rPr lang="en-GB" sz="2800" dirty="0"/>
-              <a:t>Evaluation of code performance</a:t>
-            </a:r>
-          </a:p>
-          <a:p>
-            <a:r>
-              <a:rPr lang="en-GB" sz="2800" dirty="0"/>
-              <a:t>Vectorisation techniques</a:t>
-            </a:r>
-          </a:p>
-          <a:p>
-            <a:r>
-              <a:rPr lang="en-GB" sz="2800" dirty="0"/>
-              <a:t>Managing memory effectively</a:t>
-            </a:r>
-          </a:p>
-          <a:p>
-            <a:endParaRPr lang="en-GB" sz="2800" dirty="0"/>
-          </a:p>
-          <a:p>
-            <a:endParaRPr lang="en-GB" sz="2800" dirty="0"/>
-          </a:p>
-        </p:txBody>
-      </p:sp>
-      <p:sp>
-        <p:nvSpPr>
-          <p:cNvPr id="4" name="Slide Number Placeholder 3"/>
+              <a:rPr lang="en-GB" dirty="0"/>
+              <a:t>Machine learning vs deep learning</a:t>
+            </a:r>
+          </a:p>
+        </p:txBody>
+      </p:sp>
+      <p:sp>
+        <p:nvSpPr>
+          <p:cNvPr id="3" name="Slide Number Placeholder 2">
+            <a:extLst>
+              <a:ext uri="{FF2B5EF4-FFF2-40B4-BE49-F238E27FC236}">
+                <a16:creationId xmlns:a16="http://schemas.microsoft.com/office/drawing/2014/main" id="{77EB2CD3-3CAD-E403-820A-521344F1FEEB}"/>
+              </a:ext>
+            </a:extLst>
+          </p:cNvPr>
           <p:cNvSpPr>
             <a:spLocks noGrp="1"/>
           </p:cNvSpPr>
@@ -34340,10 +34335,57 @@
           </a:p>
         </p:txBody>
       </p:sp>
+      <p:pic>
+        <p:nvPicPr>
+          <p:cNvPr id="1026" name="Picture 2" descr="Differences Between AI vs. Machine Learning vs. Deep Learning | Simplilearn">
+            <a:extLst>
+              <a:ext uri="{FF2B5EF4-FFF2-40B4-BE49-F238E27FC236}">
+                <a16:creationId xmlns:a16="http://schemas.microsoft.com/office/drawing/2014/main" id="{3FC0BBED-95A1-B4DC-7DEF-69BB1352849A}"/>
+              </a:ext>
+            </a:extLst>
+          </p:cNvPr>
+          <p:cNvPicPr>
+            <a:picLocks noChangeAspect="1" noChangeArrowheads="1"/>
+          </p:cNvPicPr>
+          <p:nvPr/>
+        </p:nvPicPr>
+        <p:blipFill>
+          <a:blip r:embed="rId2">
+            <a:extLst>
+              <a:ext uri="{28A0092B-C50C-407E-A947-70E740481C1C}">
+                <a14:useLocalDpi xmlns:a14="http://schemas.microsoft.com/office/drawing/2010/main" val="0"/>
+              </a:ext>
+            </a:extLst>
+          </a:blip>
+          <a:srcRect/>
+          <a:stretch>
+            <a:fillRect/>
+          </a:stretch>
+        </p:blipFill>
+        <p:spPr bwMode="auto">
+          <a:xfrm>
+            <a:off x="809625" y="1839912"/>
+            <a:ext cx="10572750" cy="4743450"/>
+          </a:xfrm>
+          <a:prstGeom prst="rect">
+            <a:avLst/>
+          </a:prstGeom>
+          <a:noFill/>
+          <a:extLst>
+            <a:ext uri="{909E8E84-426E-40DD-AFC4-6F175D3DCCD1}">
+              <a14:hiddenFill xmlns:a14="http://schemas.microsoft.com/office/drawing/2010/main">
+                <a:solidFill>
+                  <a:srgbClr val="FFFFFF"/>
+                </a:solidFill>
+              </a14:hiddenFill>
+            </a:ext>
+          </a:extLst>
+        </p:spPr>
+      </p:pic>
     </p:spTree>
     <p:extLst>
       <p:ext uri="{BB962C8B-B14F-4D97-AF65-F5344CB8AC3E}">
-        <p14:creationId xmlns:p14="http://schemas.microsoft.com/office/powerpoint/2010/main" val="2777187757"/>
+        <p14:creationId xmlns:p14="http://schemas.microsoft.com/office/powerpoint/2010/main" val="1817866727"/>
       </p:ext>
     </p:extLst>
   </p:cSld>
@@ -34372,146 +34414,47 @@
       </p:grpSpPr>
       <p:sp>
         <p:nvSpPr>
-          <p:cNvPr id="3" name="Content Placeholder 2"/>
+          <p:cNvPr id="2" name="Title 1">
+            <a:extLst>
+              <a:ext uri="{FF2B5EF4-FFF2-40B4-BE49-F238E27FC236}">
+                <a16:creationId xmlns:a16="http://schemas.microsoft.com/office/drawing/2014/main" id="{DC1D8423-9D70-D03D-87C2-60E9491BB510}"/>
+              </a:ext>
+            </a:extLst>
+          </p:cNvPr>
           <p:cNvSpPr>
             <a:spLocks noGrp="1"/>
           </p:cNvSpPr>
           <p:nvPr>
-            <p:ph idx="1"/>
+            <p:ph type="title"/>
           </p:nvPr>
         </p:nvSpPr>
-        <p:spPr>
-          <a:xfrm>
-            <a:off x="1310185" y="1166018"/>
-            <a:ext cx="9298675" cy="4525963"/>
-          </a:xfrm>
-        </p:spPr>
+        <p:spPr/>
         <p:txBody>
           <a:bodyPr>
-            <a:noAutofit/>
+            <a:normAutofit fontScale="90000"/>
           </a:bodyPr>
           <a:lstStyle/>
           <a:p>
-            <a:pPr marL="0" indent="0">
-              <a:buNone/>
-            </a:pPr>
-            <a:r>
-              <a:rPr lang="en-GB" sz="2400" dirty="0"/>
-              <a:t>Efficient matrix and array operations rely on data being located together in a contiguous block of memory addresses</a:t>
-            </a:r>
-          </a:p>
-          <a:p>
-            <a:pPr marL="0" indent="0">
-              <a:buNone/>
-            </a:pPr>
-            <a:endParaRPr lang="en-GB" sz="2400" dirty="0"/>
-          </a:p>
-          <a:p>
-            <a:pPr marL="0" indent="0">
-              <a:buNone/>
-            </a:pPr>
-            <a:r>
-              <a:rPr lang="en-GB" sz="2400" dirty="0"/>
-              <a:t>Create a dummy version of a variable of appropriate size</a:t>
-            </a:r>
-          </a:p>
-          <a:p>
-            <a:pPr marL="0" indent="0">
-              <a:buNone/>
-            </a:pPr>
-            <a:r>
-              <a:rPr lang="en-GB" sz="2400" dirty="0">
-                <a:latin typeface="Courier New" panose="02070309020205020404" pitchFamily="49" charset="0"/>
-                <a:cs typeface="Courier New" panose="02070309020205020404" pitchFamily="49" charset="0"/>
-              </a:rPr>
-              <a:t>&gt;&gt; A = zeros(</a:t>
-            </a:r>
-            <a:r>
-              <a:rPr lang="en-GB" sz="2400" dirty="0" err="1">
-                <a:latin typeface="Courier New" panose="02070309020205020404" pitchFamily="49" charset="0"/>
-                <a:cs typeface="Courier New" panose="02070309020205020404" pitchFamily="49" charset="0"/>
-              </a:rPr>
-              <a:t>m,n</a:t>
-            </a:r>
-            <a:r>
-              <a:rPr lang="en-GB" sz="2400" dirty="0">
-                <a:latin typeface="Courier New" panose="02070309020205020404" pitchFamily="49" charset="0"/>
-                <a:cs typeface="Courier New" panose="02070309020205020404" pitchFamily="49" charset="0"/>
-              </a:rPr>
-              <a:t>)</a:t>
-            </a:r>
-          </a:p>
-          <a:p>
-            <a:pPr marL="0" indent="0">
-              <a:buNone/>
-            </a:pPr>
-            <a:r>
-              <a:rPr lang="en-GB" sz="2400" dirty="0">
-                <a:cs typeface="Courier New" panose="02070309020205020404" pitchFamily="49" charset="0"/>
-              </a:rPr>
-              <a:t>Subsequent operations then overwrite the zeros with the required values</a:t>
-            </a:r>
-          </a:p>
-          <a:p>
-            <a:pPr marL="0" indent="0">
-              <a:buNone/>
-            </a:pPr>
-            <a:endParaRPr lang="en-GB" sz="2400" dirty="0">
-              <a:cs typeface="Courier New" panose="02070309020205020404" pitchFamily="49" charset="0"/>
-            </a:endParaRPr>
-          </a:p>
-          <a:p>
-            <a:pPr marL="0" indent="0">
-              <a:buNone/>
-            </a:pPr>
-            <a:r>
-              <a:rPr lang="en-GB" sz="2400" dirty="0">
-                <a:cs typeface="Courier New" panose="02070309020205020404" pitchFamily="49" charset="0"/>
-              </a:rPr>
-              <a:t>Assigning the last element of an array first creates an array of the appropriate size</a:t>
-            </a:r>
-          </a:p>
-          <a:p>
-            <a:pPr marL="0" indent="0">
-              <a:buNone/>
-            </a:pPr>
-            <a:r>
-              <a:rPr lang="en-GB" sz="2400" dirty="0">
-                <a:latin typeface="Courier New" panose="02070309020205020404" pitchFamily="49" charset="0"/>
-                <a:cs typeface="Courier New" panose="02070309020205020404" pitchFamily="49" charset="0"/>
-              </a:rPr>
-              <a:t>&gt;&gt; x(8) = 3</a:t>
-            </a:r>
-          </a:p>
-          <a:p>
-            <a:pPr marL="0" indent="0">
-              <a:buNone/>
-            </a:pPr>
-            <a:r>
-              <a:rPr lang="en-GB" sz="2400" dirty="0">
-                <a:latin typeface="Courier New" panose="02070309020205020404" pitchFamily="49" charset="0"/>
-                <a:cs typeface="Courier New" panose="02070309020205020404" pitchFamily="49" charset="0"/>
-              </a:rPr>
-              <a:t>x =</a:t>
-            </a:r>
-          </a:p>
-          <a:p>
-            <a:pPr marL="0" indent="0">
-              <a:buNone/>
-            </a:pPr>
-            <a:r>
-              <a:rPr lang="en-GB" sz="2400" dirty="0">
-                <a:latin typeface="Courier New" panose="02070309020205020404" pitchFamily="49" charset="0"/>
-                <a:cs typeface="Courier New" panose="02070309020205020404" pitchFamily="49" charset="0"/>
-              </a:rPr>
-              <a:t>     0     0     0     0     0     0     0     3</a:t>
-            </a:r>
-          </a:p>
-        </p:txBody>
-      </p:sp>
-      <p:sp>
-        <p:nvSpPr>
-          <p:cNvPr id="4" name="Slide Number Placeholder 3"/>
+            <a:r>
+              <a:rPr lang="en-GB" b="1" dirty="0"/>
+              <a:t>Tasks: </a:t>
+            </a:r>
+            <a:r>
+              <a:rPr lang="en-GB" dirty="0"/>
+              <a:t>Supervised learning vs unsupervised learning</a:t>
+            </a:r>
+          </a:p>
+        </p:txBody>
+      </p:sp>
+      <p:sp>
+        <p:nvSpPr>
+          <p:cNvPr id="3" name="Slide Number Placeholder 2">
+            <a:extLst>
+              <a:ext uri="{FF2B5EF4-FFF2-40B4-BE49-F238E27FC236}">
+                <a16:creationId xmlns:a16="http://schemas.microsoft.com/office/drawing/2014/main" id="{09DA5E24-92BE-0BE6-5FA2-4BACAF6E53E2}"/>
+              </a:ext>
+            </a:extLst>
+          </p:cNvPr>
           <p:cNvSpPr>
             <a:spLocks noGrp="1"/>
           </p:cNvSpPr>
@@ -34545,43 +34488,93 @@
           </a:p>
         </p:txBody>
       </p:sp>
-      <p:sp>
-        <p:nvSpPr>
-          <p:cNvPr id="5" name="Title 1"/>
-          <p:cNvSpPr>
-            <a:spLocks noGrp="1"/>
-          </p:cNvSpPr>
-          <p:nvPr>
-            <p:ph type="title"/>
-          </p:nvPr>
-        </p:nvSpPr>
+      <p:pic>
+        <p:nvPicPr>
+          <p:cNvPr id="6" name="Picture 2" descr="Supervised learning and unsupervised learning. Supervised learning uses...  | Download Scientific Diagram">
+            <a:extLst>
+              <a:ext uri="{FF2B5EF4-FFF2-40B4-BE49-F238E27FC236}">
+                <a16:creationId xmlns:a16="http://schemas.microsoft.com/office/drawing/2014/main" id="{2F0A01AF-13F5-53AC-D90E-419AE19C63B9}"/>
+              </a:ext>
+            </a:extLst>
+          </p:cNvPr>
+          <p:cNvPicPr>
+            <a:picLocks noChangeAspect="1" noChangeArrowheads="1"/>
+          </p:cNvPicPr>
+          <p:nvPr/>
+        </p:nvPicPr>
+        <p:blipFill>
+          <a:blip r:embed="rId2">
+            <a:extLst>
+              <a:ext uri="{28A0092B-C50C-407E-A947-70E740481C1C}">
+                <a14:useLocalDpi xmlns:a14="http://schemas.microsoft.com/office/drawing/2010/main" val="0"/>
+              </a:ext>
+            </a:extLst>
+          </a:blip>
+          <a:srcRect/>
+          <a:stretch>
+            <a:fillRect/>
+          </a:stretch>
+        </p:blipFill>
+        <p:spPr bwMode="auto">
+          <a:xfrm>
+            <a:off x="2807666" y="1244723"/>
+            <a:ext cx="6576667" cy="5284545"/>
+          </a:xfrm>
+          <a:prstGeom prst="rect">
+            <a:avLst/>
+          </a:prstGeom>
+          <a:noFill/>
+          <a:extLst>
+            <a:ext uri="{909E8E84-426E-40DD-AFC4-6F175D3DCCD1}">
+              <a14:hiddenFill xmlns:a14="http://schemas.microsoft.com/office/drawing/2010/main">
+                <a:solidFill>
+                  <a:srgbClr val="FFFFFF"/>
+                </a:solidFill>
+              </a14:hiddenFill>
+            </a:ext>
+          </a:extLst>
+        </p:spPr>
+      </p:pic>
+      <p:cxnSp>
+        <p:nvCxnSpPr>
+          <p:cNvPr id="8" name="Straight Connector 7">
+            <a:extLst>
+              <a:ext uri="{FF2B5EF4-FFF2-40B4-BE49-F238E27FC236}">
+                <a16:creationId xmlns:a16="http://schemas.microsoft.com/office/drawing/2014/main" id="{B4479D37-1DAC-D07B-2397-677E7A992403}"/>
+              </a:ext>
+            </a:extLst>
+          </p:cNvPr>
+          <p:cNvCxnSpPr/>
+          <p:nvPr/>
+        </p:nvCxnSpPr>
         <p:spPr>
           <a:xfrm>
-            <a:off x="1981199" y="136522"/>
-            <a:ext cx="8229600" cy="744537"/>
-          </a:xfrm>
-        </p:spPr>
-        <p:txBody>
-          <a:bodyPr>
-            <a:normAutofit/>
-          </a:bodyPr>
-          <a:lstStyle/>
-          <a:p>
-            <a:r>
-              <a:rPr lang="en-GB" sz="3600" dirty="0" err="1"/>
-              <a:t>Preallocation</a:t>
-            </a:r>
-            <a:r>
-              <a:rPr lang="en-GB" sz="3600" dirty="0"/>
-              <a:t> of Memory</a:t>
-            </a:r>
-          </a:p>
-        </p:txBody>
-      </p:sp>
+            <a:off x="265043" y="4412974"/>
+            <a:ext cx="11926957" cy="0"/>
+          </a:xfrm>
+          <a:prstGeom prst="line">
+            <a:avLst/>
+          </a:prstGeom>
+        </p:spPr>
+        <p:style>
+          <a:lnRef idx="1">
+            <a:schemeClr val="accent1"/>
+          </a:lnRef>
+          <a:fillRef idx="0">
+            <a:schemeClr val="accent1"/>
+          </a:fillRef>
+          <a:effectRef idx="0">
+            <a:schemeClr val="accent1"/>
+          </a:effectRef>
+          <a:fontRef idx="minor">
+            <a:schemeClr val="tx1"/>
+          </a:fontRef>
+        </p:style>
+      </p:cxnSp>
     </p:spTree>
     <p:extLst>
       <p:ext uri="{BB962C8B-B14F-4D97-AF65-F5344CB8AC3E}">
-        <p14:creationId xmlns:p14="http://schemas.microsoft.com/office/powerpoint/2010/main" val="72538050"/>
+        <p14:creationId xmlns:p14="http://schemas.microsoft.com/office/powerpoint/2010/main" val="439337608"/>
       </p:ext>
     </p:extLst>
   </p:cSld>
@@ -34767,7 +34760,41 @@
       </p:grpSpPr>
       <p:sp>
         <p:nvSpPr>
-          <p:cNvPr id="2" name="Slide Number Placeholder 1"/>
+          <p:cNvPr id="2" name="Title 1">
+            <a:extLst>
+              <a:ext uri="{FF2B5EF4-FFF2-40B4-BE49-F238E27FC236}">
+                <a16:creationId xmlns:a16="http://schemas.microsoft.com/office/drawing/2014/main" id="{AEBB2F36-10C9-EDC5-5336-33C2A4007BCC}"/>
+              </a:ext>
+            </a:extLst>
+          </p:cNvPr>
+          <p:cNvSpPr>
+            <a:spLocks noGrp="1"/>
+          </p:cNvSpPr>
+          <p:nvPr>
+            <p:ph type="title"/>
+          </p:nvPr>
+        </p:nvSpPr>
+        <p:spPr/>
+        <p:txBody>
+          <a:bodyPr/>
+          <a:lstStyle/>
+          <a:p>
+            <a:r>
+              <a:rPr lang="en-GB" dirty="0"/>
+              <a:t>Regression vs classification vs clustering</a:t>
+            </a:r>
+          </a:p>
+        </p:txBody>
+      </p:sp>
+      <p:sp>
+        <p:nvSpPr>
+          <p:cNvPr id="3" name="Slide Number Placeholder 2">
+            <a:extLst>
+              <a:ext uri="{FF2B5EF4-FFF2-40B4-BE49-F238E27FC236}">
+                <a16:creationId xmlns:a16="http://schemas.microsoft.com/office/drawing/2014/main" id="{220D57C2-4EEF-2E30-E88A-97D7F39E3F7B}"/>
+              </a:ext>
+            </a:extLst>
+          </p:cNvPr>
           <p:cNvSpPr>
             <a:spLocks noGrp="1"/>
           </p:cNvSpPr>
@@ -34790,6 +34817,977 @@
               </a:rPr>
               <a:pPr/>
               <a:t>50</a:t>
+            </a:fld>
+            <a:endParaRPr lang="en-GB">
+              <a:solidFill>
+                <a:prstClr val="black">
+                  <a:tint val="75000"/>
+                </a:prstClr>
+              </a:solidFill>
+            </a:endParaRPr>
+          </a:p>
+        </p:txBody>
+      </p:sp>
+      <p:pic>
+        <p:nvPicPr>
+          <p:cNvPr id="5" name="Picture 4">
+            <a:extLst>
+              <a:ext uri="{FF2B5EF4-FFF2-40B4-BE49-F238E27FC236}">
+                <a16:creationId xmlns:a16="http://schemas.microsoft.com/office/drawing/2014/main" id="{F17224A6-6BB8-233B-5E5A-EFAA90499517}"/>
+              </a:ext>
+            </a:extLst>
+          </p:cNvPr>
+          <p:cNvPicPr>
+            <a:picLocks noChangeAspect="1"/>
+          </p:cNvPicPr>
+          <p:nvPr/>
+        </p:nvPicPr>
+        <p:blipFill>
+          <a:blip r:embed="rId2"/>
+          <a:stretch>
+            <a:fillRect/>
+          </a:stretch>
+        </p:blipFill>
+        <p:spPr>
+          <a:xfrm>
+            <a:off x="917960" y="2542013"/>
+            <a:ext cx="10356080" cy="2997395"/>
+          </a:xfrm>
+          <a:prstGeom prst="rect">
+            <a:avLst/>
+          </a:prstGeom>
+        </p:spPr>
+      </p:pic>
+    </p:spTree>
+    <p:extLst>
+      <p:ext uri="{BB962C8B-B14F-4D97-AF65-F5344CB8AC3E}">
+        <p14:creationId xmlns:p14="http://schemas.microsoft.com/office/powerpoint/2010/main" val="1148636722"/>
+      </p:ext>
+    </p:extLst>
+  </p:cSld>
+  <p:clrMapOvr>
+    <a:masterClrMapping/>
+  </p:clrMapOvr>
+</p:sld>
+</file>
+
+<file path=ppt/slides/slide51.xml><?xml version="1.0" encoding="utf-8"?>
+<p:sld xmlns:a="http://schemas.openxmlformats.org/drawingml/2006/main" xmlns:r="http://schemas.openxmlformats.org/officeDocument/2006/relationships" xmlns:p="http://schemas.openxmlformats.org/presentationml/2006/main">
+  <p:cSld>
+    <p:spTree>
+      <p:nvGrpSpPr>
+        <p:cNvPr id="1" name=""/>
+        <p:cNvGrpSpPr/>
+        <p:nvPr/>
+      </p:nvGrpSpPr>
+      <p:grpSpPr>
+        <a:xfrm>
+          <a:off x="0" y="0"/>
+          <a:ext cx="0" cy="0"/>
+          <a:chOff x="0" y="0"/>
+          <a:chExt cx="0" cy="0"/>
+        </a:xfrm>
+      </p:grpSpPr>
+      <p:sp>
+        <p:nvSpPr>
+          <p:cNvPr id="2" name="Title 1">
+            <a:extLst>
+              <a:ext uri="{FF2B5EF4-FFF2-40B4-BE49-F238E27FC236}">
+                <a16:creationId xmlns:a16="http://schemas.microsoft.com/office/drawing/2014/main" id="{950FB8C2-EECF-60CE-CFAB-362D0588B908}"/>
+              </a:ext>
+            </a:extLst>
+          </p:cNvPr>
+          <p:cNvSpPr>
+            <a:spLocks noGrp="1"/>
+          </p:cNvSpPr>
+          <p:nvPr>
+            <p:ph type="title"/>
+          </p:nvPr>
+        </p:nvSpPr>
+        <p:spPr/>
+        <p:txBody>
+          <a:bodyPr/>
+          <a:lstStyle/>
+          <a:p>
+            <a:r>
+              <a:rPr lang="en-GB" dirty="0"/>
+              <a:t>How to train a model?</a:t>
+            </a:r>
+          </a:p>
+        </p:txBody>
+      </p:sp>
+      <p:sp>
+        <p:nvSpPr>
+          <p:cNvPr id="3" name="Slide Number Placeholder 2">
+            <a:extLst>
+              <a:ext uri="{FF2B5EF4-FFF2-40B4-BE49-F238E27FC236}">
+                <a16:creationId xmlns:a16="http://schemas.microsoft.com/office/drawing/2014/main" id="{F2FC7D40-0227-B62D-22EE-A2CD980D9F76}"/>
+              </a:ext>
+            </a:extLst>
+          </p:cNvPr>
+          <p:cNvSpPr>
+            <a:spLocks noGrp="1"/>
+          </p:cNvSpPr>
+          <p:nvPr>
+            <p:ph type="sldNum" sz="quarter" idx="12"/>
+          </p:nvPr>
+        </p:nvSpPr>
+        <p:spPr/>
+        <p:txBody>
+          <a:bodyPr/>
+          <a:lstStyle/>
+          <a:p>
+            <a:fld id="{83730267-60C2-4514-997F-6A8804439442}" type="slidenum">
+              <a:rPr lang="en-GB" smtClean="0">
+                <a:solidFill>
+                  <a:prstClr val="black">
+                    <a:tint val="75000"/>
+                  </a:prstClr>
+                </a:solidFill>
+              </a:rPr>
+              <a:pPr/>
+              <a:t>51</a:t>
+            </a:fld>
+            <a:endParaRPr lang="en-GB">
+              <a:solidFill>
+                <a:prstClr val="black">
+                  <a:tint val="75000"/>
+                </a:prstClr>
+              </a:solidFill>
+            </a:endParaRPr>
+          </a:p>
+        </p:txBody>
+      </p:sp>
+      <p:pic>
+        <p:nvPicPr>
+          <p:cNvPr id="3074" name="Picture 2" descr="What is Machine Learning Model Training? | Opinosis Analytics">
+            <a:extLst>
+              <a:ext uri="{FF2B5EF4-FFF2-40B4-BE49-F238E27FC236}">
+                <a16:creationId xmlns:a16="http://schemas.microsoft.com/office/drawing/2014/main" id="{E5C9638B-7E4B-784F-0648-151AE8D97C8B}"/>
+              </a:ext>
+            </a:extLst>
+          </p:cNvPr>
+          <p:cNvPicPr>
+            <a:picLocks noChangeAspect="1" noChangeArrowheads="1"/>
+          </p:cNvPicPr>
+          <p:nvPr/>
+        </p:nvPicPr>
+        <p:blipFill>
+          <a:blip r:embed="rId2">
+            <a:extLst>
+              <a:ext uri="{28A0092B-C50C-407E-A947-70E740481C1C}">
+                <a14:useLocalDpi xmlns:a14="http://schemas.microsoft.com/office/drawing/2010/main" val="0"/>
+              </a:ext>
+            </a:extLst>
+          </a:blip>
+          <a:srcRect/>
+          <a:stretch>
+            <a:fillRect/>
+          </a:stretch>
+        </p:blipFill>
+        <p:spPr bwMode="auto">
+          <a:xfrm>
+            <a:off x="2888767" y="1803210"/>
+            <a:ext cx="6878085" cy="4918268"/>
+          </a:xfrm>
+          <a:prstGeom prst="rect">
+            <a:avLst/>
+          </a:prstGeom>
+          <a:noFill/>
+          <a:extLst>
+            <a:ext uri="{909E8E84-426E-40DD-AFC4-6F175D3DCCD1}">
+              <a14:hiddenFill xmlns:a14="http://schemas.microsoft.com/office/drawing/2010/main">
+                <a:solidFill>
+                  <a:srgbClr val="FFFFFF"/>
+                </a:solidFill>
+              </a14:hiddenFill>
+            </a:ext>
+          </a:extLst>
+        </p:spPr>
+      </p:pic>
+    </p:spTree>
+    <p:extLst>
+      <p:ext uri="{BB962C8B-B14F-4D97-AF65-F5344CB8AC3E}">
+        <p14:creationId xmlns:p14="http://schemas.microsoft.com/office/powerpoint/2010/main" val="2024611758"/>
+      </p:ext>
+    </p:extLst>
+  </p:cSld>
+  <p:clrMapOvr>
+    <a:masterClrMapping/>
+  </p:clrMapOvr>
+</p:sld>
+</file>
+
+<file path=ppt/slides/slide52.xml><?xml version="1.0" encoding="utf-8"?>
+<p:sld xmlns:a="http://schemas.openxmlformats.org/drawingml/2006/main" xmlns:r="http://schemas.openxmlformats.org/officeDocument/2006/relationships" xmlns:p="http://schemas.openxmlformats.org/presentationml/2006/main">
+  <p:cSld>
+    <p:spTree>
+      <p:nvGrpSpPr>
+        <p:cNvPr id="1" name=""/>
+        <p:cNvGrpSpPr/>
+        <p:nvPr/>
+      </p:nvGrpSpPr>
+      <p:grpSpPr>
+        <a:xfrm>
+          <a:off x="0" y="0"/>
+          <a:ext cx="0" cy="0"/>
+          <a:chOff x="0" y="0"/>
+          <a:chExt cx="0" cy="0"/>
+        </a:xfrm>
+      </p:grpSpPr>
+      <p:sp>
+        <p:nvSpPr>
+          <p:cNvPr id="2" name="Title 1">
+            <a:extLst>
+              <a:ext uri="{FF2B5EF4-FFF2-40B4-BE49-F238E27FC236}">
+                <a16:creationId xmlns:a16="http://schemas.microsoft.com/office/drawing/2014/main" id="{6526419F-0E68-9C26-274E-F6801E82F293}"/>
+              </a:ext>
+            </a:extLst>
+          </p:cNvPr>
+          <p:cNvSpPr>
+            <a:spLocks noGrp="1"/>
+          </p:cNvSpPr>
+          <p:nvPr>
+            <p:ph type="title"/>
+          </p:nvPr>
+        </p:nvSpPr>
+        <p:spPr/>
+        <p:txBody>
+          <a:bodyPr/>
+          <a:lstStyle/>
+          <a:p>
+            <a:r>
+              <a:rPr lang="en-GB" dirty="0"/>
+              <a:t>Software Testing</a:t>
+            </a:r>
+          </a:p>
+        </p:txBody>
+      </p:sp>
+      <p:sp>
+        <p:nvSpPr>
+          <p:cNvPr id="3" name="Content Placeholder 2">
+            <a:extLst>
+              <a:ext uri="{FF2B5EF4-FFF2-40B4-BE49-F238E27FC236}">
+                <a16:creationId xmlns:a16="http://schemas.microsoft.com/office/drawing/2014/main" id="{4795FF2B-4679-C340-3F12-BED74CA25425}"/>
+              </a:ext>
+            </a:extLst>
+          </p:cNvPr>
+          <p:cNvSpPr>
+            <a:spLocks noGrp="1"/>
+          </p:cNvSpPr>
+          <p:nvPr>
+            <p:ph idx="1"/>
+          </p:nvPr>
+        </p:nvSpPr>
+        <p:spPr/>
+        <p:txBody>
+          <a:bodyPr/>
+          <a:lstStyle/>
+          <a:p>
+            <a:pPr marL="0" indent="0">
+              <a:buNone/>
+            </a:pPr>
+            <a:r>
+              <a:rPr lang="en-GB" dirty="0"/>
+              <a:t>Please take a look at this blog before the session tomorrow:</a:t>
+            </a:r>
+          </a:p>
+          <a:p>
+            <a:pPr marL="0" indent="0">
+              <a:buNone/>
+            </a:pPr>
+            <a:r>
+              <a:rPr lang="en-GB" dirty="0">
+                <a:hlinkClick r:id="rId2"/>
+              </a:rPr>
+              <a:t>A Brief Introduction to Software Testing</a:t>
+            </a:r>
+            <a:endParaRPr lang="en-GB" dirty="0"/>
+          </a:p>
+        </p:txBody>
+      </p:sp>
+      <p:sp>
+        <p:nvSpPr>
+          <p:cNvPr id="4" name="Slide Number Placeholder 3">
+            <a:extLst>
+              <a:ext uri="{FF2B5EF4-FFF2-40B4-BE49-F238E27FC236}">
+                <a16:creationId xmlns:a16="http://schemas.microsoft.com/office/drawing/2014/main" id="{AF86B5FF-55B2-D4F8-CA74-07D9F383239A}"/>
+              </a:ext>
+            </a:extLst>
+          </p:cNvPr>
+          <p:cNvSpPr>
+            <a:spLocks noGrp="1"/>
+          </p:cNvSpPr>
+          <p:nvPr>
+            <p:ph type="sldNum" sz="quarter" idx="12"/>
+          </p:nvPr>
+        </p:nvSpPr>
+        <p:spPr/>
+        <p:txBody>
+          <a:bodyPr/>
+          <a:lstStyle/>
+          <a:p>
+            <a:fld id="{83730267-60C2-4514-997F-6A8804439442}" type="slidenum">
+              <a:rPr lang="en-GB" smtClean="0">
+                <a:solidFill>
+                  <a:prstClr val="black">
+                    <a:tint val="75000"/>
+                  </a:prstClr>
+                </a:solidFill>
+              </a:rPr>
+              <a:pPr/>
+              <a:t>52</a:t>
+            </a:fld>
+            <a:endParaRPr lang="en-GB">
+              <a:solidFill>
+                <a:prstClr val="black">
+                  <a:tint val="75000"/>
+                </a:prstClr>
+              </a:solidFill>
+            </a:endParaRPr>
+          </a:p>
+        </p:txBody>
+      </p:sp>
+    </p:spTree>
+    <p:extLst>
+      <p:ext uri="{BB962C8B-B14F-4D97-AF65-F5344CB8AC3E}">
+        <p14:creationId xmlns:p14="http://schemas.microsoft.com/office/powerpoint/2010/main" val="2224768003"/>
+      </p:ext>
+    </p:extLst>
+  </p:cSld>
+  <p:clrMapOvr>
+    <a:masterClrMapping/>
+  </p:clrMapOvr>
+</p:sld>
+</file>
+
+<file path=ppt/slides/slide53.xml><?xml version="1.0" encoding="utf-8"?>
+<p:sld xmlns:a="http://schemas.openxmlformats.org/drawingml/2006/main" xmlns:r="http://schemas.openxmlformats.org/officeDocument/2006/relationships" xmlns:p="http://schemas.openxmlformats.org/presentationml/2006/main">
+  <p:cSld>
+    <p:spTree>
+      <p:nvGrpSpPr>
+        <p:cNvPr id="1" name=""/>
+        <p:cNvGrpSpPr/>
+        <p:nvPr/>
+      </p:nvGrpSpPr>
+      <p:grpSpPr>
+        <a:xfrm>
+          <a:off x="0" y="0"/>
+          <a:ext cx="0" cy="0"/>
+          <a:chOff x="0" y="0"/>
+          <a:chExt cx="0" cy="0"/>
+        </a:xfrm>
+      </p:grpSpPr>
+      <p:sp>
+        <p:nvSpPr>
+          <p:cNvPr id="2" name="Title 1">
+            <a:extLst>
+              <a:ext uri="{FF2B5EF4-FFF2-40B4-BE49-F238E27FC236}">
+                <a16:creationId xmlns:a16="http://schemas.microsoft.com/office/drawing/2014/main" id="{0205CA92-26BA-C99F-E8BA-840A9551647E}"/>
+              </a:ext>
+            </a:extLst>
+          </p:cNvPr>
+          <p:cNvSpPr>
+            <a:spLocks noGrp="1"/>
+          </p:cNvSpPr>
+          <p:nvPr>
+            <p:ph type="title"/>
+          </p:nvPr>
+        </p:nvSpPr>
+        <p:spPr/>
+        <p:txBody>
+          <a:bodyPr/>
+          <a:lstStyle/>
+          <a:p>
+            <a:r>
+              <a:rPr lang="en-GB" dirty="0"/>
+              <a:t>Software Testing</a:t>
+            </a:r>
+          </a:p>
+        </p:txBody>
+      </p:sp>
+      <p:sp>
+        <p:nvSpPr>
+          <p:cNvPr id="3" name="Slide Number Placeholder 2">
+            <a:extLst>
+              <a:ext uri="{FF2B5EF4-FFF2-40B4-BE49-F238E27FC236}">
+                <a16:creationId xmlns:a16="http://schemas.microsoft.com/office/drawing/2014/main" id="{B6F8BE1A-2466-3F24-2684-11CE2A09FB21}"/>
+              </a:ext>
+            </a:extLst>
+          </p:cNvPr>
+          <p:cNvSpPr>
+            <a:spLocks noGrp="1"/>
+          </p:cNvSpPr>
+          <p:nvPr>
+            <p:ph type="sldNum" sz="quarter" idx="12"/>
+          </p:nvPr>
+        </p:nvSpPr>
+        <p:spPr/>
+        <p:txBody>
+          <a:bodyPr/>
+          <a:lstStyle/>
+          <a:p>
+            <a:fld id="{83730267-60C2-4514-997F-6A8804439442}" type="slidenum">
+              <a:rPr lang="en-GB" smtClean="0">
+                <a:solidFill>
+                  <a:prstClr val="black">
+                    <a:tint val="75000"/>
+                  </a:prstClr>
+                </a:solidFill>
+              </a:rPr>
+              <a:pPr/>
+              <a:t>53</a:t>
+            </a:fld>
+            <a:endParaRPr lang="en-GB">
+              <a:solidFill>
+                <a:prstClr val="black">
+                  <a:tint val="75000"/>
+                </a:prstClr>
+              </a:solidFill>
+            </a:endParaRPr>
+          </a:p>
+        </p:txBody>
+      </p:sp>
+      <p:pic>
+        <p:nvPicPr>
+          <p:cNvPr id="6" name="Picture 5" descr="A qr code with black squares&#10;&#10;Description automatically generated with low confidence">
+            <a:extLst>
+              <a:ext uri="{FF2B5EF4-FFF2-40B4-BE49-F238E27FC236}">
+                <a16:creationId xmlns:a16="http://schemas.microsoft.com/office/drawing/2014/main" id="{3A8A9B7C-999C-A7A8-4CB2-B3C7D2DD3139}"/>
+              </a:ext>
+            </a:extLst>
+          </p:cNvPr>
+          <p:cNvPicPr>
+            <a:picLocks noChangeAspect="1"/>
+          </p:cNvPicPr>
+          <p:nvPr/>
+        </p:nvPicPr>
+        <p:blipFill>
+          <a:blip r:embed="rId2" cstate="print">
+            <a:extLst>
+              <a:ext uri="{28A0092B-C50C-407E-A947-70E740481C1C}">
+                <a14:useLocalDpi xmlns:a14="http://schemas.microsoft.com/office/drawing/2010/main" val="0"/>
+              </a:ext>
+            </a:extLst>
+          </a:blip>
+          <a:stretch>
+            <a:fillRect/>
+          </a:stretch>
+        </p:blipFill>
+        <p:spPr>
+          <a:xfrm>
+            <a:off x="6549452" y="1768839"/>
+            <a:ext cx="3971499" cy="3971499"/>
+          </a:xfrm>
+          <a:prstGeom prst="rect">
+            <a:avLst/>
+          </a:prstGeom>
+        </p:spPr>
+      </p:pic>
+      <p:sp>
+        <p:nvSpPr>
+          <p:cNvPr id="7" name="TextBox 6">
+            <a:extLst>
+              <a:ext uri="{FF2B5EF4-FFF2-40B4-BE49-F238E27FC236}">
+                <a16:creationId xmlns:a16="http://schemas.microsoft.com/office/drawing/2014/main" id="{06D11BCB-D72E-F6D9-DAB5-FF70E2770653}"/>
+              </a:ext>
+            </a:extLst>
+          </p:cNvPr>
+          <p:cNvSpPr txBox="1"/>
+          <p:nvPr/>
+        </p:nvSpPr>
+        <p:spPr>
+          <a:xfrm>
+            <a:off x="609600" y="1768839"/>
+            <a:ext cx="5777552" cy="3416320"/>
+          </a:xfrm>
+          <a:prstGeom prst="rect">
+            <a:avLst/>
+          </a:prstGeom>
+          <a:noFill/>
+        </p:spPr>
+        <p:txBody>
+          <a:bodyPr wrap="square" rtlCol="0">
+            <a:spAutoFit/>
+          </a:bodyPr>
+          <a:lstStyle/>
+          <a:p>
+            <a:r>
+              <a:rPr lang="en-GB" sz="3600" dirty="0"/>
+              <a:t>How do you test your code?</a:t>
+            </a:r>
+          </a:p>
+          <a:p>
+            <a:endParaRPr lang="en-GB" sz="3600" dirty="0"/>
+          </a:p>
+          <a:p>
+            <a:r>
+              <a:rPr lang="en-GB" sz="3600" dirty="0"/>
+              <a:t>How do you know it gives the right answers?</a:t>
+            </a:r>
+          </a:p>
+          <a:p>
+            <a:endParaRPr lang="en-GB" sz="3600" dirty="0"/>
+          </a:p>
+          <a:p>
+            <a:r>
+              <a:rPr lang="en-GB" sz="3600" dirty="0"/>
+              <a:t>Add your ideas to the </a:t>
+            </a:r>
+            <a:r>
+              <a:rPr lang="en-GB" sz="3600" dirty="0" err="1"/>
+              <a:t>padlet</a:t>
+            </a:r>
+            <a:r>
+              <a:rPr lang="en-GB" sz="3600" dirty="0"/>
+              <a:t>:</a:t>
+            </a:r>
+          </a:p>
+        </p:txBody>
+      </p:sp>
+    </p:spTree>
+    <p:extLst>
+      <p:ext uri="{BB962C8B-B14F-4D97-AF65-F5344CB8AC3E}">
+        <p14:creationId xmlns:p14="http://schemas.microsoft.com/office/powerpoint/2010/main" val="441908946"/>
+      </p:ext>
+    </p:extLst>
+  </p:cSld>
+  <p:clrMapOvr>
+    <a:masterClrMapping/>
+  </p:clrMapOvr>
+</p:sld>
+</file>
+
+<file path=ppt/slides/slide54.xml><?xml version="1.0" encoding="utf-8"?>
+<p:sld xmlns:a="http://schemas.openxmlformats.org/drawingml/2006/main" xmlns:r="http://schemas.openxmlformats.org/officeDocument/2006/relationships" xmlns:p="http://schemas.openxmlformats.org/presentationml/2006/main">
+  <p:cSld>
+    <p:spTree>
+      <p:nvGrpSpPr>
+        <p:cNvPr id="1" name=""/>
+        <p:cNvGrpSpPr/>
+        <p:nvPr/>
+      </p:nvGrpSpPr>
+      <p:grpSpPr>
+        <a:xfrm>
+          <a:off x="0" y="0"/>
+          <a:ext cx="0" cy="0"/>
+          <a:chOff x="0" y="0"/>
+          <a:chExt cx="0" cy="0"/>
+        </a:xfrm>
+      </p:grpSpPr>
+      <p:sp>
+        <p:nvSpPr>
+          <p:cNvPr id="2" name="Title 1"/>
+          <p:cNvSpPr>
+            <a:spLocks noGrp="1"/>
+          </p:cNvSpPr>
+          <p:nvPr>
+            <p:ph type="title"/>
+          </p:nvPr>
+        </p:nvSpPr>
+        <p:spPr/>
+        <p:txBody>
+          <a:bodyPr>
+            <a:normAutofit/>
+          </a:bodyPr>
+          <a:lstStyle/>
+          <a:p>
+            <a:r>
+              <a:rPr lang="en-GB" sz="3600" dirty="0"/>
+              <a:t>Debugging and Improving Performance</a:t>
+            </a:r>
+          </a:p>
+        </p:txBody>
+      </p:sp>
+      <p:sp>
+        <p:nvSpPr>
+          <p:cNvPr id="3" name="Content Placeholder 2"/>
+          <p:cNvSpPr>
+            <a:spLocks noGrp="1"/>
+          </p:cNvSpPr>
+          <p:nvPr>
+            <p:ph idx="1"/>
+          </p:nvPr>
+        </p:nvSpPr>
+        <p:spPr/>
+        <p:txBody>
+          <a:bodyPr>
+            <a:normAutofit/>
+          </a:bodyPr>
+          <a:lstStyle/>
+          <a:p>
+            <a:pPr marL="0" indent="0">
+              <a:buNone/>
+            </a:pPr>
+            <a:endParaRPr lang="en-GB" sz="2800" dirty="0"/>
+          </a:p>
+          <a:p>
+            <a:r>
+              <a:rPr lang="en-GB" sz="2800" dirty="0"/>
+              <a:t>Diagnosing problems</a:t>
+            </a:r>
+          </a:p>
+          <a:p>
+            <a:r>
+              <a:rPr lang="en-GB" sz="2800" dirty="0"/>
+              <a:t>Identifying common errors</a:t>
+            </a:r>
+          </a:p>
+          <a:p>
+            <a:r>
+              <a:rPr lang="en-GB" sz="2800" dirty="0"/>
+              <a:t>Evaluation of code performance</a:t>
+            </a:r>
+          </a:p>
+          <a:p>
+            <a:r>
+              <a:rPr lang="en-GB" sz="2800" dirty="0"/>
+              <a:t>Vectorisation techniques</a:t>
+            </a:r>
+          </a:p>
+          <a:p>
+            <a:r>
+              <a:rPr lang="en-GB" sz="2800" dirty="0"/>
+              <a:t>Managing memory effectively</a:t>
+            </a:r>
+          </a:p>
+          <a:p>
+            <a:endParaRPr lang="en-GB" sz="2800" dirty="0"/>
+          </a:p>
+          <a:p>
+            <a:endParaRPr lang="en-GB" sz="2800" dirty="0"/>
+          </a:p>
+        </p:txBody>
+      </p:sp>
+      <p:sp>
+        <p:nvSpPr>
+          <p:cNvPr id="4" name="Slide Number Placeholder 3"/>
+          <p:cNvSpPr>
+            <a:spLocks noGrp="1"/>
+          </p:cNvSpPr>
+          <p:nvPr>
+            <p:ph type="sldNum" sz="quarter" idx="12"/>
+          </p:nvPr>
+        </p:nvSpPr>
+        <p:spPr/>
+        <p:txBody>
+          <a:bodyPr/>
+          <a:lstStyle/>
+          <a:p>
+            <a:fld id="{83730267-60C2-4514-997F-6A8804439442}" type="slidenum">
+              <a:rPr lang="en-GB" smtClean="0">
+                <a:solidFill>
+                  <a:prstClr val="black">
+                    <a:tint val="75000"/>
+                  </a:prstClr>
+                </a:solidFill>
+              </a:rPr>
+              <a:pPr/>
+              <a:t>54</a:t>
+            </a:fld>
+            <a:endParaRPr lang="en-GB">
+              <a:solidFill>
+                <a:prstClr val="black">
+                  <a:tint val="75000"/>
+                </a:prstClr>
+              </a:solidFill>
+            </a:endParaRPr>
+          </a:p>
+        </p:txBody>
+      </p:sp>
+    </p:spTree>
+    <p:extLst>
+      <p:ext uri="{BB962C8B-B14F-4D97-AF65-F5344CB8AC3E}">
+        <p14:creationId xmlns:p14="http://schemas.microsoft.com/office/powerpoint/2010/main" val="2777187757"/>
+      </p:ext>
+    </p:extLst>
+  </p:cSld>
+  <p:clrMapOvr>
+    <a:masterClrMapping/>
+  </p:clrMapOvr>
+</p:sld>
+</file>
+
+<file path=ppt/slides/slide55.xml><?xml version="1.0" encoding="utf-8"?>
+<p:sld xmlns:a="http://schemas.openxmlformats.org/drawingml/2006/main" xmlns:r="http://schemas.openxmlformats.org/officeDocument/2006/relationships" xmlns:p="http://schemas.openxmlformats.org/presentationml/2006/main">
+  <p:cSld>
+    <p:spTree>
+      <p:nvGrpSpPr>
+        <p:cNvPr id="1" name=""/>
+        <p:cNvGrpSpPr/>
+        <p:nvPr/>
+      </p:nvGrpSpPr>
+      <p:grpSpPr>
+        <a:xfrm>
+          <a:off x="0" y="0"/>
+          <a:ext cx="0" cy="0"/>
+          <a:chOff x="0" y="0"/>
+          <a:chExt cx="0" cy="0"/>
+        </a:xfrm>
+      </p:grpSpPr>
+      <p:sp>
+        <p:nvSpPr>
+          <p:cNvPr id="3" name="Content Placeholder 2"/>
+          <p:cNvSpPr>
+            <a:spLocks noGrp="1"/>
+          </p:cNvSpPr>
+          <p:nvPr>
+            <p:ph idx="1"/>
+          </p:nvPr>
+        </p:nvSpPr>
+        <p:spPr>
+          <a:xfrm>
+            <a:off x="1310185" y="1166018"/>
+            <a:ext cx="9298675" cy="4525963"/>
+          </a:xfrm>
+        </p:spPr>
+        <p:txBody>
+          <a:bodyPr>
+            <a:noAutofit/>
+          </a:bodyPr>
+          <a:lstStyle/>
+          <a:p>
+            <a:pPr marL="0" indent="0">
+              <a:buNone/>
+            </a:pPr>
+            <a:r>
+              <a:rPr lang="en-GB" sz="2400" dirty="0"/>
+              <a:t>Efficient matrix and array operations rely on data being located together in a contiguous block of memory addresses</a:t>
+            </a:r>
+          </a:p>
+          <a:p>
+            <a:pPr marL="0" indent="0">
+              <a:buNone/>
+            </a:pPr>
+            <a:endParaRPr lang="en-GB" sz="2400" dirty="0"/>
+          </a:p>
+          <a:p>
+            <a:pPr marL="0" indent="0">
+              <a:buNone/>
+            </a:pPr>
+            <a:r>
+              <a:rPr lang="en-GB" sz="2400" dirty="0"/>
+              <a:t>Create a dummy version of a variable of appropriate size</a:t>
+            </a:r>
+          </a:p>
+          <a:p>
+            <a:pPr marL="0" indent="0">
+              <a:buNone/>
+            </a:pPr>
+            <a:r>
+              <a:rPr lang="en-GB" sz="2400" dirty="0">
+                <a:latin typeface="Courier New" panose="02070309020205020404" pitchFamily="49" charset="0"/>
+                <a:cs typeface="Courier New" panose="02070309020205020404" pitchFamily="49" charset="0"/>
+              </a:rPr>
+              <a:t>&gt;&gt; A = zeros(</a:t>
+            </a:r>
+            <a:r>
+              <a:rPr lang="en-GB" sz="2400" dirty="0" err="1">
+                <a:latin typeface="Courier New" panose="02070309020205020404" pitchFamily="49" charset="0"/>
+                <a:cs typeface="Courier New" panose="02070309020205020404" pitchFamily="49" charset="0"/>
+              </a:rPr>
+              <a:t>m,n</a:t>
+            </a:r>
+            <a:r>
+              <a:rPr lang="en-GB" sz="2400" dirty="0">
+                <a:latin typeface="Courier New" panose="02070309020205020404" pitchFamily="49" charset="0"/>
+                <a:cs typeface="Courier New" panose="02070309020205020404" pitchFamily="49" charset="0"/>
+              </a:rPr>
+              <a:t>)</a:t>
+            </a:r>
+          </a:p>
+          <a:p>
+            <a:pPr marL="0" indent="0">
+              <a:buNone/>
+            </a:pPr>
+            <a:r>
+              <a:rPr lang="en-GB" sz="2400" dirty="0">
+                <a:cs typeface="Courier New" panose="02070309020205020404" pitchFamily="49" charset="0"/>
+              </a:rPr>
+              <a:t>Subsequent operations then overwrite the zeros with the required values</a:t>
+            </a:r>
+          </a:p>
+          <a:p>
+            <a:pPr marL="0" indent="0">
+              <a:buNone/>
+            </a:pPr>
+            <a:endParaRPr lang="en-GB" sz="2400" dirty="0">
+              <a:cs typeface="Courier New" panose="02070309020205020404" pitchFamily="49" charset="0"/>
+            </a:endParaRPr>
+          </a:p>
+          <a:p>
+            <a:pPr marL="0" indent="0">
+              <a:buNone/>
+            </a:pPr>
+            <a:r>
+              <a:rPr lang="en-GB" sz="2400" dirty="0">
+                <a:cs typeface="Courier New" panose="02070309020205020404" pitchFamily="49" charset="0"/>
+              </a:rPr>
+              <a:t>Assigning the last element of an array first creates an array of the appropriate size</a:t>
+            </a:r>
+          </a:p>
+          <a:p>
+            <a:pPr marL="0" indent="0">
+              <a:buNone/>
+            </a:pPr>
+            <a:r>
+              <a:rPr lang="en-GB" sz="2400" dirty="0">
+                <a:latin typeface="Courier New" panose="02070309020205020404" pitchFamily="49" charset="0"/>
+                <a:cs typeface="Courier New" panose="02070309020205020404" pitchFamily="49" charset="0"/>
+              </a:rPr>
+              <a:t>&gt;&gt; x(8) = 3</a:t>
+            </a:r>
+          </a:p>
+          <a:p>
+            <a:pPr marL="0" indent="0">
+              <a:buNone/>
+            </a:pPr>
+            <a:r>
+              <a:rPr lang="en-GB" sz="2400" dirty="0">
+                <a:latin typeface="Courier New" panose="02070309020205020404" pitchFamily="49" charset="0"/>
+                <a:cs typeface="Courier New" panose="02070309020205020404" pitchFamily="49" charset="0"/>
+              </a:rPr>
+              <a:t>x =</a:t>
+            </a:r>
+          </a:p>
+          <a:p>
+            <a:pPr marL="0" indent="0">
+              <a:buNone/>
+            </a:pPr>
+            <a:r>
+              <a:rPr lang="en-GB" sz="2400" dirty="0">
+                <a:latin typeface="Courier New" panose="02070309020205020404" pitchFamily="49" charset="0"/>
+                <a:cs typeface="Courier New" panose="02070309020205020404" pitchFamily="49" charset="0"/>
+              </a:rPr>
+              <a:t>     0     0     0     0     0     0     0     3</a:t>
+            </a:r>
+          </a:p>
+        </p:txBody>
+      </p:sp>
+      <p:sp>
+        <p:nvSpPr>
+          <p:cNvPr id="4" name="Slide Number Placeholder 3"/>
+          <p:cNvSpPr>
+            <a:spLocks noGrp="1"/>
+          </p:cNvSpPr>
+          <p:nvPr>
+            <p:ph type="sldNum" sz="quarter" idx="12"/>
+          </p:nvPr>
+        </p:nvSpPr>
+        <p:spPr/>
+        <p:txBody>
+          <a:bodyPr/>
+          <a:lstStyle/>
+          <a:p>
+            <a:fld id="{83730267-60C2-4514-997F-6A8804439442}" type="slidenum">
+              <a:rPr lang="en-GB" smtClean="0">
+                <a:solidFill>
+                  <a:prstClr val="black">
+                    <a:tint val="75000"/>
+                  </a:prstClr>
+                </a:solidFill>
+              </a:rPr>
+              <a:pPr/>
+              <a:t>55</a:t>
+            </a:fld>
+            <a:endParaRPr lang="en-GB">
+              <a:solidFill>
+                <a:prstClr val="black">
+                  <a:tint val="75000"/>
+                </a:prstClr>
+              </a:solidFill>
+            </a:endParaRPr>
+          </a:p>
+        </p:txBody>
+      </p:sp>
+      <p:sp>
+        <p:nvSpPr>
+          <p:cNvPr id="5" name="Title 1"/>
+          <p:cNvSpPr>
+            <a:spLocks noGrp="1"/>
+          </p:cNvSpPr>
+          <p:nvPr>
+            <p:ph type="title"/>
+          </p:nvPr>
+        </p:nvSpPr>
+        <p:spPr>
+          <a:xfrm>
+            <a:off x="1981199" y="136522"/>
+            <a:ext cx="8229600" cy="744537"/>
+          </a:xfrm>
+        </p:spPr>
+        <p:txBody>
+          <a:bodyPr>
+            <a:normAutofit/>
+          </a:bodyPr>
+          <a:lstStyle/>
+          <a:p>
+            <a:r>
+              <a:rPr lang="en-GB" sz="3600" dirty="0" err="1"/>
+              <a:t>Preallocation</a:t>
+            </a:r>
+            <a:r>
+              <a:rPr lang="en-GB" sz="3600" dirty="0"/>
+              <a:t> of Memory</a:t>
+            </a:r>
+          </a:p>
+        </p:txBody>
+      </p:sp>
+    </p:spTree>
+    <p:extLst>
+      <p:ext uri="{BB962C8B-B14F-4D97-AF65-F5344CB8AC3E}">
+        <p14:creationId xmlns:p14="http://schemas.microsoft.com/office/powerpoint/2010/main" val="72538050"/>
+      </p:ext>
+    </p:extLst>
+  </p:cSld>
+  <p:clrMapOvr>
+    <a:masterClrMapping/>
+  </p:clrMapOvr>
+</p:sld>
+</file>
+
+<file path=ppt/slides/slide56.xml><?xml version="1.0" encoding="utf-8"?>
+<p:sld xmlns:a="http://schemas.openxmlformats.org/drawingml/2006/main" xmlns:r="http://schemas.openxmlformats.org/officeDocument/2006/relationships" xmlns:p="http://schemas.openxmlformats.org/presentationml/2006/main">
+  <p:cSld>
+    <p:spTree>
+      <p:nvGrpSpPr>
+        <p:cNvPr id="1" name=""/>
+        <p:cNvGrpSpPr/>
+        <p:nvPr/>
+      </p:nvGrpSpPr>
+      <p:grpSpPr>
+        <a:xfrm>
+          <a:off x="0" y="0"/>
+          <a:ext cx="0" cy="0"/>
+          <a:chOff x="0" y="0"/>
+          <a:chExt cx="0" cy="0"/>
+        </a:xfrm>
+      </p:grpSpPr>
+      <p:sp>
+        <p:nvSpPr>
+          <p:cNvPr id="2" name="Slide Number Placeholder 1"/>
+          <p:cNvSpPr>
+            <a:spLocks noGrp="1"/>
+          </p:cNvSpPr>
+          <p:nvPr>
+            <p:ph type="sldNum" sz="quarter" idx="12"/>
+          </p:nvPr>
+        </p:nvSpPr>
+        <p:spPr/>
+        <p:txBody>
+          <a:bodyPr/>
+          <a:lstStyle/>
+          <a:p>
+            <a:fld id="{83730267-60C2-4514-997F-6A8804439442}" type="slidenum">
+              <a:rPr lang="en-GB" smtClean="0">
+                <a:solidFill>
+                  <a:prstClr val="black">
+                    <a:tint val="75000"/>
+                  </a:prstClr>
+                </a:solidFill>
+              </a:rPr>
+              <a:pPr/>
+              <a:t>56</a:t>
             </a:fld>
             <a:endParaRPr lang="en-GB">
               <a:solidFill>
@@ -35961,7 +36959,7 @@
 </p:sld>
 </file>
 
-<file path=ppt/slides/slide51.xml><?xml version="1.0" encoding="utf-8"?>
+<file path=ppt/slides/slide57.xml><?xml version="1.0" encoding="utf-8"?>
 <p:sld xmlns:a="http://schemas.openxmlformats.org/drawingml/2006/main" xmlns:r="http://schemas.openxmlformats.org/officeDocument/2006/relationships" xmlns:p="http://schemas.openxmlformats.org/presentationml/2006/main">
   <p:cSld>
     <p:spTree>
@@ -36002,7 +37000,7 @@
                 </a:solidFill>
               </a:rPr>
               <a:pPr/>
-              <a:t>51</a:t>
+              <a:t>57</a:t>
             </a:fld>
             <a:endParaRPr lang="en-GB">
               <a:solidFill>
@@ -37445,7 +38443,7 @@
 </p:sld>
 </file>
 
-<file path=ppt/slides/slide52.xml><?xml version="1.0" encoding="utf-8"?>
+<file path=ppt/slides/slide58.xml><?xml version="1.0" encoding="utf-8"?>
 <p:sld xmlns:a="http://schemas.openxmlformats.org/drawingml/2006/main" xmlns:r="http://schemas.openxmlformats.org/officeDocument/2006/relationships" xmlns:p="http://schemas.openxmlformats.org/presentationml/2006/main">
   <p:cSld>
     <p:spTree>
@@ -37492,7 +38490,7 @@
                 </a:solidFill>
               </a:rPr>
               <a:pPr/>
-              <a:t>52</a:t>
+              <a:t>58</a:t>
             </a:fld>
             <a:endParaRPr lang="en-GB">
               <a:solidFill>
@@ -37555,7 +38553,7 @@
 </p:sld>
 </file>
 
-<file path=ppt/slides/slide53.xml><?xml version="1.0" encoding="utf-8"?>
+<file path=ppt/slides/slide59.xml><?xml version="1.0" encoding="utf-8"?>
 <p:sld xmlns:a="http://schemas.openxmlformats.org/drawingml/2006/main" xmlns:r="http://schemas.openxmlformats.org/officeDocument/2006/relationships" xmlns:p="http://schemas.openxmlformats.org/presentationml/2006/main">
   <p:cSld>
     <p:spTree>
@@ -37630,7 +38628,7 @@
                 </a:solidFill>
               </a:rPr>
               <a:pPr/>
-              <a:t>53</a:t>
+              <a:t>59</a:t>
             </a:fld>
             <a:endParaRPr lang="en-GB">
               <a:solidFill>
@@ -38030,7 +39028,7 @@
 </p:sld>
 </file>
 
-<file path=ppt/slides/slide54.xml><?xml version="1.0" encoding="utf-8"?>
+<file path=ppt/slides/slide6.xml><?xml version="1.0" encoding="utf-8"?>
 <p:sld xmlns:a="http://schemas.openxmlformats.org/drawingml/2006/main" xmlns:r="http://schemas.openxmlformats.org/officeDocument/2006/relationships" xmlns:p="http://schemas.openxmlformats.org/presentationml/2006/main">
   <p:cSld>
     <p:spTree>
@@ -38052,6 +39050,213 @@
           <p:cNvPr id="2" name="Title 1">
             <a:extLst>
               <a:ext uri="{FF2B5EF4-FFF2-40B4-BE49-F238E27FC236}">
+                <a16:creationId xmlns:a16="http://schemas.microsoft.com/office/drawing/2014/main" id="{40D5D897-C18F-B0B5-4CDA-74882944139B}"/>
+              </a:ext>
+            </a:extLst>
+          </p:cNvPr>
+          <p:cNvSpPr>
+            <a:spLocks noGrp="1"/>
+          </p:cNvSpPr>
+          <p:nvPr>
+            <p:ph type="title"/>
+          </p:nvPr>
+        </p:nvSpPr>
+        <p:spPr/>
+        <p:txBody>
+          <a:bodyPr/>
+          <a:lstStyle/>
+          <a:p>
+            <a:pPr algn="ctr"/>
+            <a:r>
+              <a:rPr lang="en-GB" dirty="0"/>
+              <a:t>Multiple users can safely work on one file</a:t>
+            </a:r>
+          </a:p>
+        </p:txBody>
+      </p:sp>
+      <p:sp>
+        <p:nvSpPr>
+          <p:cNvPr id="3" name="TextBox 2">
+            <a:extLst>
+              <a:ext uri="{FF2B5EF4-FFF2-40B4-BE49-F238E27FC236}">
+                <a16:creationId xmlns:a16="http://schemas.microsoft.com/office/drawing/2014/main" id="{6BF671E0-20D7-D764-C7DA-CC6FB292AD44}"/>
+              </a:ext>
+            </a:extLst>
+          </p:cNvPr>
+          <p:cNvSpPr txBox="1"/>
+          <p:nvPr/>
+        </p:nvSpPr>
+        <p:spPr>
+          <a:xfrm>
+            <a:off x="800878" y="4918162"/>
+            <a:ext cx="4008582" cy="646331"/>
+          </a:xfrm>
+          <a:prstGeom prst="rect">
+            <a:avLst/>
+          </a:prstGeom>
+          <a:noFill/>
+        </p:spPr>
+        <p:txBody>
+          <a:bodyPr wrap="square" rtlCol="0">
+            <a:spAutoFit/>
+          </a:bodyPr>
+          <a:lstStyle/>
+          <a:p>
+            <a:r>
+              <a:rPr lang="en-GB" dirty="0"/>
+              <a:t>Multiple users can make independent changes to the same document</a:t>
+            </a:r>
+          </a:p>
+        </p:txBody>
+      </p:sp>
+      <p:pic>
+        <p:nvPicPr>
+          <p:cNvPr id="4" name="Graphic 3" descr="Diagram showing two sets of changes being made to one file by different users&#10;">
+            <a:extLst>
+              <a:ext uri="{FF2B5EF4-FFF2-40B4-BE49-F238E27FC236}">
+                <a16:creationId xmlns:a16="http://schemas.microsoft.com/office/drawing/2014/main" id="{949B2F37-0131-C5B0-2B7B-4ADD0C55B421}"/>
+              </a:ext>
+            </a:extLst>
+          </p:cNvPr>
+          <p:cNvPicPr>
+            <a:picLocks noChangeAspect="1"/>
+          </p:cNvPicPr>
+          <p:nvPr/>
+        </p:nvPicPr>
+        <p:blipFill>
+          <a:blip r:embed="rId2">
+            <a:extLst>
+              <a:ext uri="{28A0092B-C50C-407E-A947-70E740481C1C}">
+                <a14:useLocalDpi xmlns:a14="http://schemas.microsoft.com/office/drawing/2010/main" val="0"/>
+              </a:ext>
+              <a:ext uri="{96DAC541-7B7A-43D3-8B79-37D633B846F1}">
+                <asvg:svgBlip xmlns:asvg="http://schemas.microsoft.com/office/drawing/2016/SVG/main" r:embed="rId3"/>
+              </a:ext>
+            </a:extLst>
+          </a:blip>
+          <a:stretch>
+            <a:fillRect/>
+          </a:stretch>
+        </p:blipFill>
+        <p:spPr>
+          <a:xfrm>
+            <a:off x="1158240" y="1447172"/>
+            <a:ext cx="3718560" cy="3428048"/>
+          </a:xfrm>
+          <a:prstGeom prst="rect">
+            <a:avLst/>
+          </a:prstGeom>
+        </p:spPr>
+      </p:pic>
+      <p:sp>
+        <p:nvSpPr>
+          <p:cNvPr id="5" name="TextBox 4">
+            <a:extLst>
+              <a:ext uri="{FF2B5EF4-FFF2-40B4-BE49-F238E27FC236}">
+                <a16:creationId xmlns:a16="http://schemas.microsoft.com/office/drawing/2014/main" id="{5D0284E0-F847-232E-F4BD-8BF313B35734}"/>
+              </a:ext>
+            </a:extLst>
+          </p:cNvPr>
+          <p:cNvSpPr txBox="1"/>
+          <p:nvPr/>
+        </p:nvSpPr>
+        <p:spPr>
+          <a:xfrm>
+            <a:off x="5468851" y="4875220"/>
+            <a:ext cx="6096000" cy="923330"/>
+          </a:xfrm>
+          <a:prstGeom prst="rect">
+            <a:avLst/>
+          </a:prstGeom>
+          <a:noFill/>
+        </p:spPr>
+        <p:txBody>
+          <a:bodyPr wrap="square">
+            <a:spAutoFit/>
+          </a:bodyPr>
+          <a:lstStyle/>
+          <a:p>
+            <a:r>
+              <a:rPr lang="en-GB" dirty="0"/>
+              <a:t>Unless multiple users make changes to the same section of the document - a conflict - you can incorporate two sets of changes into the same base document.</a:t>
+            </a:r>
+          </a:p>
+        </p:txBody>
+      </p:sp>
+      <p:pic>
+        <p:nvPicPr>
+          <p:cNvPr id="6" name="Graphic 5" descr="Diagram showing 2 sets of file changes being merged into on">
+            <a:extLst>
+              <a:ext uri="{FF2B5EF4-FFF2-40B4-BE49-F238E27FC236}">
+                <a16:creationId xmlns:a16="http://schemas.microsoft.com/office/drawing/2014/main" id="{DF303866-8CCE-802B-0596-C69CACB73179}"/>
+              </a:ext>
+            </a:extLst>
+          </p:cNvPr>
+          <p:cNvPicPr>
+            <a:picLocks noChangeAspect="1"/>
+          </p:cNvPicPr>
+          <p:nvPr/>
+        </p:nvPicPr>
+        <p:blipFill>
+          <a:blip r:embed="rId4">
+            <a:extLst>
+              <a:ext uri="{28A0092B-C50C-407E-A947-70E740481C1C}">
+                <a14:useLocalDpi xmlns:a14="http://schemas.microsoft.com/office/drawing/2010/main" val="0"/>
+              </a:ext>
+              <a:ext uri="{96DAC541-7B7A-43D3-8B79-37D633B846F1}">
+                <asvg:svgBlip xmlns:asvg="http://schemas.microsoft.com/office/drawing/2016/SVG/main" r:embed="rId5"/>
+              </a:ext>
+            </a:extLst>
+          </a:blip>
+          <a:stretch>
+            <a:fillRect/>
+          </a:stretch>
+        </p:blipFill>
+        <p:spPr>
+          <a:xfrm>
+            <a:off x="6787633" y="1308626"/>
+            <a:ext cx="3768043" cy="3616564"/>
+          </a:xfrm>
+          <a:prstGeom prst="rect">
+            <a:avLst/>
+          </a:prstGeom>
+        </p:spPr>
+      </p:pic>
+    </p:spTree>
+    <p:extLst>
+      <p:ext uri="{BB962C8B-B14F-4D97-AF65-F5344CB8AC3E}">
+        <p14:creationId xmlns:p14="http://schemas.microsoft.com/office/powerpoint/2010/main" val="4207908417"/>
+      </p:ext>
+    </p:extLst>
+  </p:cSld>
+  <p:clrMapOvr>
+    <a:masterClrMapping/>
+  </p:clrMapOvr>
+</p:sld>
+</file>
+
+<file path=ppt/slides/slide60.xml><?xml version="1.0" encoding="utf-8"?>
+<p:sld xmlns:a="http://schemas.openxmlformats.org/drawingml/2006/main" xmlns:r="http://schemas.openxmlformats.org/officeDocument/2006/relationships" xmlns:p="http://schemas.openxmlformats.org/presentationml/2006/main">
+  <p:cSld>
+    <p:spTree>
+      <p:nvGrpSpPr>
+        <p:cNvPr id="1" name=""/>
+        <p:cNvGrpSpPr/>
+        <p:nvPr/>
+      </p:nvGrpSpPr>
+      <p:grpSpPr>
+        <a:xfrm>
+          <a:off x="0" y="0"/>
+          <a:ext cx="0" cy="0"/>
+          <a:chOff x="0" y="0"/>
+          <a:chExt cx="0" cy="0"/>
+        </a:xfrm>
+      </p:grpSpPr>
+      <p:sp>
+        <p:nvSpPr>
+          <p:cNvPr id="2" name="Title 1">
+            <a:extLst>
+              <a:ext uri="{FF2B5EF4-FFF2-40B4-BE49-F238E27FC236}">
                 <a16:creationId xmlns:a16="http://schemas.microsoft.com/office/drawing/2014/main" id="{745EDC30-381B-D32C-34A6-349302CE2999}"/>
               </a:ext>
             </a:extLst>
@@ -38105,7 +39310,7 @@
                 </a:solidFill>
               </a:rPr>
               <a:pPr/>
-              <a:t>54</a:t>
+              <a:t>60</a:t>
             </a:fld>
             <a:endParaRPr lang="en-GB">
               <a:solidFill>
@@ -38213,7 +39418,7 @@
 </p:sld>
 </file>
 
-<file path=ppt/slides/slide55.xml><?xml version="1.0" encoding="utf-8"?>
+<file path=ppt/slides/slide61.xml><?xml version="1.0" encoding="utf-8"?>
 <p:sld xmlns:a="http://schemas.openxmlformats.org/drawingml/2006/main" xmlns:r="http://schemas.openxmlformats.org/officeDocument/2006/relationships" xmlns:p="http://schemas.openxmlformats.org/presentationml/2006/main">
   <p:cSld>
     <p:spTree>
@@ -38288,7 +39493,7 @@
                 </a:solidFill>
               </a:rPr>
               <a:pPr/>
-              <a:t>55</a:t>
+              <a:t>61</a:t>
             </a:fld>
             <a:endParaRPr lang="en-GB">
               <a:solidFill>
@@ -38419,7 +39624,7 @@
 </p:sld>
 </file>
 
-<file path=ppt/slides/slide56.xml><?xml version="1.0" encoding="utf-8"?>
+<file path=ppt/slides/slide62.xml><?xml version="1.0" encoding="utf-8"?>
 <p:sld xmlns:a="http://schemas.openxmlformats.org/drawingml/2006/main" xmlns:r="http://schemas.openxmlformats.org/officeDocument/2006/relationships" xmlns:p="http://schemas.openxmlformats.org/presentationml/2006/main">
   <p:cSld>
     <p:spTree>
@@ -38496,7 +39701,7 @@
                 </a:solidFill>
               </a:rPr>
               <a:pPr/>
-              <a:t>56</a:t>
+              <a:t>62</a:t>
             </a:fld>
             <a:endParaRPr lang="en-GB">
               <a:solidFill>
@@ -38743,7 +39948,7 @@
 </p:sld>
 </file>
 
-<file path=ppt/slides/slide57.xml><?xml version="1.0" encoding="utf-8"?>
+<file path=ppt/slides/slide63.xml><?xml version="1.0" encoding="utf-8"?>
 <p:sld xmlns:a="http://schemas.openxmlformats.org/drawingml/2006/main" xmlns:r="http://schemas.openxmlformats.org/officeDocument/2006/relationships" xmlns:p="http://schemas.openxmlformats.org/presentationml/2006/main">
   <p:cSld>
     <p:spTree>
@@ -38853,7 +40058,7 @@
                 </a:solidFill>
               </a:rPr>
               <a:pPr/>
-              <a:t>57</a:t>
+              <a:t>63</a:t>
             </a:fld>
             <a:endParaRPr lang="en-GB">
               <a:solidFill>
@@ -38878,7 +40083,7 @@
 </p:sld>
 </file>
 
-<file path=ppt/slides/slide58.xml><?xml version="1.0" encoding="utf-8"?>
+<file path=ppt/slides/slide64.xml><?xml version="1.0" encoding="utf-8"?>
 <p:sld xmlns:a="http://schemas.openxmlformats.org/drawingml/2006/main" xmlns:r="http://schemas.openxmlformats.org/officeDocument/2006/relationships" xmlns:p="http://schemas.openxmlformats.org/presentationml/2006/main">
   <p:cSld>
     <p:spTree>
@@ -39186,7 +40391,7 @@
                 </a:solidFill>
               </a:rPr>
               <a:pPr/>
-              <a:t>58</a:t>
+              <a:t>64</a:t>
             </a:fld>
             <a:endParaRPr lang="en-GB">
               <a:solidFill>
@@ -39285,7 +40490,7 @@
 </p:sld>
 </file>
 
-<file path=ppt/slides/slide59.xml><?xml version="1.0" encoding="utf-8"?>
+<file path=ppt/slides/slide65.xml><?xml version="1.0" encoding="utf-8"?>
 <p:sld xmlns:a="http://schemas.openxmlformats.org/drawingml/2006/main" xmlns:r="http://schemas.openxmlformats.org/officeDocument/2006/relationships" xmlns:p="http://schemas.openxmlformats.org/presentationml/2006/main">
   <p:cSld>
     <p:spTree>
@@ -39402,7 +40607,7 @@
                 <a:tabLst/>
                 <a:defRPr/>
               </a:pPr>
-              <a:t>59</a:t>
+              <a:t>65</a:t>
             </a:fld>
             <a:endParaRPr kumimoji="0" lang="en-GB" sz="1200" b="0" i="0" u="none" strike="noStrike" kern="1200" cap="none" spc="0" normalizeH="0" baseline="0" noProof="0">
               <a:ln>
@@ -39843,213 +41048,6 @@
     <p:extLst>
       <p:ext uri="{BB962C8B-B14F-4D97-AF65-F5344CB8AC3E}">
         <p14:creationId xmlns:p14="http://schemas.microsoft.com/office/powerpoint/2010/main" val="2365206936"/>
-      </p:ext>
-    </p:extLst>
-  </p:cSld>
-  <p:clrMapOvr>
-    <a:masterClrMapping/>
-  </p:clrMapOvr>
-</p:sld>
-</file>
-
-<file path=ppt/slides/slide6.xml><?xml version="1.0" encoding="utf-8"?>
-<p:sld xmlns:a="http://schemas.openxmlformats.org/drawingml/2006/main" xmlns:r="http://schemas.openxmlformats.org/officeDocument/2006/relationships" xmlns:p="http://schemas.openxmlformats.org/presentationml/2006/main">
-  <p:cSld>
-    <p:spTree>
-      <p:nvGrpSpPr>
-        <p:cNvPr id="1" name=""/>
-        <p:cNvGrpSpPr/>
-        <p:nvPr/>
-      </p:nvGrpSpPr>
-      <p:grpSpPr>
-        <a:xfrm>
-          <a:off x="0" y="0"/>
-          <a:ext cx="0" cy="0"/>
-          <a:chOff x="0" y="0"/>
-          <a:chExt cx="0" cy="0"/>
-        </a:xfrm>
-      </p:grpSpPr>
-      <p:sp>
-        <p:nvSpPr>
-          <p:cNvPr id="2" name="Title 1">
-            <a:extLst>
-              <a:ext uri="{FF2B5EF4-FFF2-40B4-BE49-F238E27FC236}">
-                <a16:creationId xmlns:a16="http://schemas.microsoft.com/office/drawing/2014/main" id="{40D5D897-C18F-B0B5-4CDA-74882944139B}"/>
-              </a:ext>
-            </a:extLst>
-          </p:cNvPr>
-          <p:cNvSpPr>
-            <a:spLocks noGrp="1"/>
-          </p:cNvSpPr>
-          <p:nvPr>
-            <p:ph type="title"/>
-          </p:nvPr>
-        </p:nvSpPr>
-        <p:spPr/>
-        <p:txBody>
-          <a:bodyPr/>
-          <a:lstStyle/>
-          <a:p>
-            <a:pPr algn="ctr"/>
-            <a:r>
-              <a:rPr lang="en-GB" dirty="0"/>
-              <a:t>Multiple users can safely work on one file</a:t>
-            </a:r>
-          </a:p>
-        </p:txBody>
-      </p:sp>
-      <p:sp>
-        <p:nvSpPr>
-          <p:cNvPr id="3" name="TextBox 2">
-            <a:extLst>
-              <a:ext uri="{FF2B5EF4-FFF2-40B4-BE49-F238E27FC236}">
-                <a16:creationId xmlns:a16="http://schemas.microsoft.com/office/drawing/2014/main" id="{6BF671E0-20D7-D764-C7DA-CC6FB292AD44}"/>
-              </a:ext>
-            </a:extLst>
-          </p:cNvPr>
-          <p:cNvSpPr txBox="1"/>
-          <p:nvPr/>
-        </p:nvSpPr>
-        <p:spPr>
-          <a:xfrm>
-            <a:off x="800878" y="4918162"/>
-            <a:ext cx="4008582" cy="646331"/>
-          </a:xfrm>
-          <a:prstGeom prst="rect">
-            <a:avLst/>
-          </a:prstGeom>
-          <a:noFill/>
-        </p:spPr>
-        <p:txBody>
-          <a:bodyPr wrap="square" rtlCol="0">
-            <a:spAutoFit/>
-          </a:bodyPr>
-          <a:lstStyle/>
-          <a:p>
-            <a:r>
-              <a:rPr lang="en-GB" dirty="0"/>
-              <a:t>Multiple users can make independent changes to the same document</a:t>
-            </a:r>
-          </a:p>
-        </p:txBody>
-      </p:sp>
-      <p:pic>
-        <p:nvPicPr>
-          <p:cNvPr id="4" name="Graphic 3" descr="Diagram showing two sets of changes being made to one file by different users&#10;">
-            <a:extLst>
-              <a:ext uri="{FF2B5EF4-FFF2-40B4-BE49-F238E27FC236}">
-                <a16:creationId xmlns:a16="http://schemas.microsoft.com/office/drawing/2014/main" id="{949B2F37-0131-C5B0-2B7B-4ADD0C55B421}"/>
-              </a:ext>
-            </a:extLst>
-          </p:cNvPr>
-          <p:cNvPicPr>
-            <a:picLocks noChangeAspect="1"/>
-          </p:cNvPicPr>
-          <p:nvPr/>
-        </p:nvPicPr>
-        <p:blipFill>
-          <a:blip r:embed="rId2">
-            <a:extLst>
-              <a:ext uri="{28A0092B-C50C-407E-A947-70E740481C1C}">
-                <a14:useLocalDpi xmlns:a14="http://schemas.microsoft.com/office/drawing/2010/main" val="0"/>
-              </a:ext>
-              <a:ext uri="{96DAC541-7B7A-43D3-8B79-37D633B846F1}">
-                <asvg:svgBlip xmlns:asvg="http://schemas.microsoft.com/office/drawing/2016/SVG/main" r:embed="rId3"/>
-              </a:ext>
-            </a:extLst>
-          </a:blip>
-          <a:stretch>
-            <a:fillRect/>
-          </a:stretch>
-        </p:blipFill>
-        <p:spPr>
-          <a:xfrm>
-            <a:off x="1158240" y="1447172"/>
-            <a:ext cx="3718560" cy="3428048"/>
-          </a:xfrm>
-          <a:prstGeom prst="rect">
-            <a:avLst/>
-          </a:prstGeom>
-        </p:spPr>
-      </p:pic>
-      <p:sp>
-        <p:nvSpPr>
-          <p:cNvPr id="5" name="TextBox 4">
-            <a:extLst>
-              <a:ext uri="{FF2B5EF4-FFF2-40B4-BE49-F238E27FC236}">
-                <a16:creationId xmlns:a16="http://schemas.microsoft.com/office/drawing/2014/main" id="{5D0284E0-F847-232E-F4BD-8BF313B35734}"/>
-              </a:ext>
-            </a:extLst>
-          </p:cNvPr>
-          <p:cNvSpPr txBox="1"/>
-          <p:nvPr/>
-        </p:nvSpPr>
-        <p:spPr>
-          <a:xfrm>
-            <a:off x="5468851" y="4875220"/>
-            <a:ext cx="6096000" cy="923330"/>
-          </a:xfrm>
-          <a:prstGeom prst="rect">
-            <a:avLst/>
-          </a:prstGeom>
-          <a:noFill/>
-        </p:spPr>
-        <p:txBody>
-          <a:bodyPr wrap="square">
-            <a:spAutoFit/>
-          </a:bodyPr>
-          <a:lstStyle/>
-          <a:p>
-            <a:r>
-              <a:rPr lang="en-GB" dirty="0"/>
-              <a:t>Unless multiple users make changes to the same section of the document - a conflict - you can incorporate two sets of changes into the same base document.</a:t>
-            </a:r>
-          </a:p>
-        </p:txBody>
-      </p:sp>
-      <p:pic>
-        <p:nvPicPr>
-          <p:cNvPr id="6" name="Graphic 5" descr="Diagram showing 2 sets of file changes being merged into on">
-            <a:extLst>
-              <a:ext uri="{FF2B5EF4-FFF2-40B4-BE49-F238E27FC236}">
-                <a16:creationId xmlns:a16="http://schemas.microsoft.com/office/drawing/2014/main" id="{DF303866-8CCE-802B-0596-C69CACB73179}"/>
-              </a:ext>
-            </a:extLst>
-          </p:cNvPr>
-          <p:cNvPicPr>
-            <a:picLocks noChangeAspect="1"/>
-          </p:cNvPicPr>
-          <p:nvPr/>
-        </p:nvPicPr>
-        <p:blipFill>
-          <a:blip r:embed="rId4">
-            <a:extLst>
-              <a:ext uri="{28A0092B-C50C-407E-A947-70E740481C1C}">
-                <a14:useLocalDpi xmlns:a14="http://schemas.microsoft.com/office/drawing/2010/main" val="0"/>
-              </a:ext>
-              <a:ext uri="{96DAC541-7B7A-43D3-8B79-37D633B846F1}">
-                <asvg:svgBlip xmlns:asvg="http://schemas.microsoft.com/office/drawing/2016/SVG/main" r:embed="rId5"/>
-              </a:ext>
-            </a:extLst>
-          </a:blip>
-          <a:stretch>
-            <a:fillRect/>
-          </a:stretch>
-        </p:blipFill>
-        <p:spPr>
-          <a:xfrm>
-            <a:off x="6787633" y="1308626"/>
-            <a:ext cx="3768043" cy="3616564"/>
-          </a:xfrm>
-          <a:prstGeom prst="rect">
-            <a:avLst/>
-          </a:prstGeom>
-        </p:spPr>
-      </p:pic>
-    </p:spTree>
-    <p:extLst>
-      <p:ext uri="{BB962C8B-B14F-4D97-AF65-F5344CB8AC3E}">
-        <p14:creationId xmlns:p14="http://schemas.microsoft.com/office/powerpoint/2010/main" val="4207908417"/>
       </p:ext>
     </p:extLst>
   </p:cSld>

</xml_diff>